<commit_message>
Update before removing from hard disk
</commit_message>
<xml_diff>
--- a/Strategic Thinking and Coordination_20151103.pptx
+++ b/Strategic Thinking and Coordination_20151103.pptx
@@ -308,7 +308,7 @@
           <a:p>
             <a:fld id="{24CE221E-83ED-4F6C-BA5F-3F9E6FDB6953}" type="datetimeFigureOut">
               <a:rPr lang="en-US"/>
-              <a:t>11/3/2015</a:t>
+              <a:t>11/4/2015</a:t>
             </a:fld>
             <a:endParaRPr dirty="0"/>
           </a:p>
@@ -389,6 +389,869 @@
   </p:cSld>
   <p:clrMap bg1="lt1" tx1="dk1" bg2="lt2" tx2="dk2" accent1="accent1" accent2="accent2" accent3="accent3" accent4="accent4" accent5="accent5" accent6="accent6" hlink="hlink" folHlink="folHlink"/>
 </p:handoutMaster>
+</file>
+
+<file path=ppt/ink/ink1.xml><?xml version="1.0" encoding="utf-8"?>
+<inkml:ink xmlns:inkml="http://www.w3.org/2003/InkML">
+  <inkml:definitions>
+    <inkml:context xml:id="ctx0">
+      <inkml:inkSource xml:id="inkSrc0">
+        <inkml:traceFormat>
+          <inkml:channel name="X" type="integer" max="27760" units="cm"/>
+          <inkml:channel name="Y" type="integer" max="15694" units="cm"/>
+          <inkml:channel name="F" type="integer" max="255" units="dev"/>
+          <inkml:channel name="T" type="integer" max="2.14748E9" units="dev"/>
+        </inkml:traceFormat>
+        <inkml:channelProperties>
+          <inkml:channelProperty channel="X" name="resolution" value="1000" units="1/cm"/>
+          <inkml:channelProperty channel="Y" name="resolution" value="1000.25494" units="1/cm"/>
+          <inkml:channelProperty channel="F" name="resolution" value="0" units="1/dev"/>
+          <inkml:channelProperty channel="T" name="resolution" value="1" units="1/dev"/>
+        </inkml:channelProperties>
+      </inkml:inkSource>
+      <inkml:timestamp xml:id="ts0" timeString="2015-11-04T18:51:19.123"/>
+    </inkml:context>
+    <inkml:brush xml:id="br0">
+      <inkml:brushProperty name="width" value="0.06667" units="cm"/>
+      <inkml:brushProperty name="height" value="0.06667" units="cm"/>
+      <inkml:brushProperty name="color" value="#ED1C24"/>
+      <inkml:brushProperty name="fitToCurve" value="1"/>
+    </inkml:brush>
+  </inkml:definitions>
+  <inkml:traceGroup>
+    <inkml:annotationXML>
+      <emma:emma xmlns:emma="http://www.w3.org/2003/04/emma" version="1.0">
+        <emma:interpretation id="{2D32145B-F328-48D1-BBEB-E75D5CA624DE}" emma:medium="tactile" emma:mode="ink">
+          <msink:context xmlns:msink="http://schemas.microsoft.com/ink/2010/main" type="writingRegion" rotatedBoundingBox="665,9904 2350,9904 2350,16316 665,16316"/>
+        </emma:interpretation>
+      </emma:emma>
+    </inkml:annotationXML>
+    <inkml:traceGroup>
+      <inkml:annotationXML>
+        <emma:emma xmlns:emma="http://www.w3.org/2003/04/emma" version="1.0">
+          <emma:interpretation id="{5447618B-4BB3-4507-A0A9-48C36854F8B1}" emma:medium="tactile" emma:mode="ink">
+            <msink:context xmlns:msink="http://schemas.microsoft.com/ink/2010/main" type="paragraph" rotatedBoundingBox="665,9904 2350,9904 2350,16316 665,16316" alignmentLevel="1"/>
+          </emma:interpretation>
+        </emma:emma>
+      </inkml:annotationXML>
+      <inkml:traceGroup>
+        <inkml:annotationXML>
+          <emma:emma xmlns:emma="http://www.w3.org/2003/04/emma" version="1.0">
+            <emma:interpretation id="{653C3E3B-3669-4BEF-8E38-B7DAE99C7D4D}" emma:medium="tactile" emma:mode="ink">
+              <msink:context xmlns:msink="http://schemas.microsoft.com/ink/2010/main" type="line" rotatedBoundingBox="665,9904 2350,9904 2350,16316 665,16316"/>
+            </emma:interpretation>
+          </emma:emma>
+        </inkml:annotationXML>
+        <inkml:traceGroup>
+          <inkml:annotationXML>
+            <emma:emma xmlns:emma="http://www.w3.org/2003/04/emma" version="1.0">
+              <emma:interpretation id="{139A95D9-A6E7-4546-A419-A1436AF52226}" emma:medium="tactile" emma:mode="ink">
+                <msink:context xmlns:msink="http://schemas.microsoft.com/ink/2010/main" type="inkWord" rotatedBoundingBox="646,16311 769,9897 2454,9930 2331,16343"/>
+              </emma:interpretation>
+              <emma:one-of disjunction-type="recognition" id="oneOf0">
+                <emma:interpretation id="interp0" emma:lang="en-US" emma:confidence="0">
+                  <emma:literal>}</emma:literal>
+                </emma:interpretation>
+                <emma:interpretation id="interp1" emma:lang="en-US" emma:confidence="0">
+                  <emma:literal>b</emma:literal>
+                </emma:interpretation>
+                <emma:interpretation id="interp2" emma:lang="en-US" emma:confidence="0">
+                  <emma:literal>1</emma:literal>
+                </emma:interpretation>
+                <emma:interpretation id="interp3" emma:lang="en-US" emma:confidence="0">
+                  <emma:literal>;</emma:literal>
+                </emma:interpretation>
+                <emma:interpretation id="interp4" emma:lang="en-US" emma:confidence="0">
+                  <emma:literal>L</emma:literal>
+                </emma:interpretation>
+              </emma:one-of>
+            </emma:emma>
+          </inkml:annotationXML>
+          <inkml:trace contextRef="#ctx0" brushRef="#br0">0 175 1 0,'11'-36'0'0,"15"14"11"0,-16-10-1 15,12 8-9-15,8 3-1 16,5 2 1-16,6 10-1 15,2 5 2-15,4-5 2 16,7 9 1-16,4 2 2 16,7 1 2-16,10 7 0 15,3-5 1-15,8 12-1 16,0-4 0-16,9 14-2 0,-9-1-2 16,-4 6-1-16,-15 5-1 15,-15 6-1-15,-24 8 0 16,-20 11-2-16,-31 13 0 15,-27 0 0-15,-28 9 0 16,-12-5 0-16,-14-2 0 16,-5-4 0-16,1-4-1 15,7-20 1-15,17-15 0 16,17-8 0-16,19-9-1 16,18-4 0-16,30-13-1 15,0 0 1-15,50 4 0 16,8-8 0-16,24 0 0 15,15-3 1-15,19 3-1 0,7 8 1 16,8 5 0 0,-3 6 0-16,-12 10 1 0,-11 10-2 15,-23 12 2 1,-17 13 1-16,-28 13 1 0,-22 13 0 16,-39 4 2-16,-15 12 1 15,-21-9 0-15,-9 9 0 16,-17-5-1-16,0-7 0 15,-3-13-1-15,1-13-1 16,12-17-2-16,5-14 0 16,11-3-2-16,2-18 0 15,8-9-1-15,-1-14-1 16,10 2-6-16,-3-8-7 0,10 4-18 16,4 13-1-16,-11-17 0 15,15 0 20 1</inkml:trace>
+          <inkml:trace contextRef="#ctx0" brushRef="#br0" timeOffset="1532.0262">19 4253 1 0,'-12'-53'8'0,"20"31"19"0,-12-16 0 15,10-5-17-15,14 4-4 16,3-2-2-1,8 3-1-15,-3-3-1 16,4 3 1-16,-6-3 0 0,-3 7 1 16,1 4 0-16,2 6 0 15,0 0 0-15,11 7-1 16,3 2 0-16,14 9-2 16,13 10 0-16,11 5-1 15,4 10 0-15,6 9 1 16,-2 15-2-16,-2 10 2 15,-11 12-1-15,-12 12 1 16,-25 8-1-16,-18 14 0 16,-27 10 1-16,-28 9-1 15,-27 0 1-15,-22 0-1 16,-18-7 1-16,-12-8-1 16,-3-13 0-16,5-17 1 0,11-19-1 15,19-14 0-15,17-14-1 16,22-13-1-16,17-11 1 15,28-2-1-15,10-26 1 16,27 5 0-16,28-5 0 16,23-4 0-16,24 5 0 15,19 3 2-15,18 11-1 16,4 11 0-16,2 15 0 16,-4 11 1-16,-19 11 0 15,-18 14 1-15,-28 11 2 16,-21 17 0-16,-35 9 1 15,-28 15 0-15,-41 4 1 16,-25 5 1-16,-33 3-1 0,-22 8 1 16,-23-16-3-16,-7-13 0 15,-8-12-1-15,10-18 0 16,14-11-3-16,12-12-2 16,15-15 0-16,12-18-4 15,18 5-3-15,5-19-6 16,21 4-10-16,5 0-11 15,0-24 0-15,15 0 1 16</inkml:trace>
+        </inkml:traceGroup>
+      </inkml:traceGroup>
+    </inkml:traceGroup>
+  </inkml:traceGroup>
+</inkml:ink>
+</file>
+
+<file path=ppt/ink/ink10.xml><?xml version="1.0" encoding="utf-8"?>
+<inkml:ink xmlns:inkml="http://www.w3.org/2003/InkML">
+  <inkml:definitions>
+    <inkml:context xml:id="ctx0">
+      <inkml:inkSource xml:id="inkSrc0">
+        <inkml:traceFormat>
+          <inkml:channel name="X" type="integer" max="27760" units="cm"/>
+          <inkml:channel name="Y" type="integer" max="15694" units="cm"/>
+          <inkml:channel name="F" type="integer" max="255" units="dev"/>
+          <inkml:channel name="T" type="integer" max="2.14748E9" units="dev"/>
+        </inkml:traceFormat>
+        <inkml:channelProperties>
+          <inkml:channelProperty channel="X" name="resolution" value="1000" units="1/cm"/>
+          <inkml:channelProperty channel="Y" name="resolution" value="1000.25494" units="1/cm"/>
+          <inkml:channelProperty channel="F" name="resolution" value="0" units="1/dev"/>
+          <inkml:channelProperty channel="T" name="resolution" value="1" units="1/dev"/>
+        </inkml:channelProperties>
+      </inkml:inkSource>
+      <inkml:timestamp xml:id="ts0" timeString="2015-11-04T18:53:36.295"/>
+    </inkml:context>
+    <inkml:brush xml:id="br0">
+      <inkml:brushProperty name="width" value="0.06667" units="cm"/>
+      <inkml:brushProperty name="height" value="0.06667" units="cm"/>
+      <inkml:brushProperty name="color" value="#ED1C24"/>
+      <inkml:brushProperty name="fitToCurve" value="1"/>
+    </inkml:brush>
+  </inkml:definitions>
+  <inkml:traceGroup>
+    <inkml:annotationXML>
+      <emma:emma xmlns:emma="http://www.w3.org/2003/04/emma" version="1.0">
+        <emma:interpretation id="{646FEA62-4E1B-4B11-9834-26B13ECAFE1C}" emma:medium="tactile" emma:mode="ink">
+          <msink:context xmlns:msink="http://schemas.microsoft.com/ink/2010/main" type="writingRegion" rotatedBoundingBox="14681,3261 16551,3261 16551,5197 14681,5197"/>
+        </emma:interpretation>
+      </emma:emma>
+    </inkml:annotationXML>
+    <inkml:traceGroup>
+      <inkml:annotationXML>
+        <emma:emma xmlns:emma="http://www.w3.org/2003/04/emma" version="1.0">
+          <emma:interpretation id="{A5912589-824B-40ED-8DBD-E6448A60419E}" emma:medium="tactile" emma:mode="ink">
+            <msink:context xmlns:msink="http://schemas.microsoft.com/ink/2010/main" type="paragraph" rotatedBoundingBox="14681,3261 16551,3261 16551,5197 14681,5197" alignmentLevel="1"/>
+          </emma:interpretation>
+        </emma:emma>
+      </inkml:annotationXML>
+      <inkml:traceGroup>
+        <inkml:annotationXML>
+          <emma:emma xmlns:emma="http://www.w3.org/2003/04/emma" version="1.0">
+            <emma:interpretation id="{00059FCA-A66E-46EB-8F9A-C595F1FA498C}" emma:medium="tactile" emma:mode="ink">
+              <msink:context xmlns:msink="http://schemas.microsoft.com/ink/2010/main" type="line" rotatedBoundingBox="14681,3261 16551,3261 16551,5197 14681,5197"/>
+            </emma:interpretation>
+          </emma:emma>
+        </inkml:annotationXML>
+        <inkml:traceGroup>
+          <inkml:annotationXML>
+            <emma:emma xmlns:emma="http://www.w3.org/2003/04/emma" version="1.0">
+              <emma:interpretation id="{ABCFDD4D-218E-44B5-87C2-44BD1556ECE1}" emma:medium="tactile" emma:mode="ink">
+                <msink:context xmlns:msink="http://schemas.microsoft.com/ink/2010/main" type="inkWord" rotatedBoundingBox="14681,3261 16551,3261 16551,5197 14681,5197"/>
+              </emma:interpretation>
+              <emma:one-of disjunction-type="recognition" id="oneOf0">
+                <emma:interpretation id="interp0" emma:lang="en-US" emma:confidence="0">
+                  <emma:literal>•</emma:literal>
+                </emma:interpretation>
+                <emma:interpretation id="interp1" emma:lang="en-US" emma:confidence="0">
+                  <emma:literal>4</emma:literal>
+                </emma:interpretation>
+                <emma:interpretation id="interp2" emma:lang="en-US" emma:confidence="0">
+                  <emma:literal>6</emma:literal>
+                </emma:interpretation>
+                <emma:interpretation id="interp3" emma:lang="en-US" emma:confidence="0">
+                  <emma:literal>y</emma:literal>
+                </emma:interpretation>
+                <emma:interpretation id="interp4" emma:lang="en-US" emma:confidence="0">
+                  <emma:literal>'</emma:literal>
+                </emma:interpretation>
+              </emma:one-of>
+            </emma:emma>
+          </inkml:annotationXML>
+          <inkml:trace contextRef="#ctx0" brushRef="#br0">505 25 12 0,'17'-34'33'0,"3"25"0"16,-20 9 0-16,-17 35-29 15,-7 10-3-15,-8 25-1 16,-16 7 0-16,-10 22 0 16,-7 13-1-16,-6 5 2 15,0 1 0-15,4-17 2 16,18-7 1-16,14-19 1 0,27-8 0 15,23-20-1-15,30-9 1 16,24-12-2-16,24-4 0 16,23-10-1-16,18 1-1 15,8 2-1-15,13-4 1 16,2 0-2-16,3-9 0 16,-3-9 0-16,-8-8-1 15,-14 3-2-15,-20-14-2 16,-14-4-3-16,-34-11-1 15,-20 0 0-15,-34-8 0 16,-22 6 1-16,-27-12 0 16,-16 1 2-16,-15-6 2 15,-6 0 4-15,-2 0 3 0,-3-2 1 16,7 6 2-16,0 3 1 16,15 12 2-16,2 7 1 15,15 14-1 1,-2 10 0-16,17 25 0 0,1 19-2 15,8 30 0-15,-3 22-2 16,1 34 0-16,-4 17-2 16,-3 24 0-16,-6 12-3 15,-7-1-2-15,0-5-1 16,-1-26-1-16,8-16 0 16,-1-42 0-16,12-25 0 15,6-36 0-15,13-22 2 16,17-43 0-16,13-11-5 0,7 1-22 15,8-42 0-15,20 3-1 16,0-11 21 0</inkml:trace>
+        </inkml:traceGroup>
+      </inkml:traceGroup>
+    </inkml:traceGroup>
+  </inkml:traceGroup>
+</inkml:ink>
+</file>
+
+<file path=ppt/ink/ink11.xml><?xml version="1.0" encoding="utf-8"?>
+<inkml:ink xmlns:inkml="http://www.w3.org/2003/InkML">
+  <inkml:definitions>
+    <inkml:context xml:id="ctx0">
+      <inkml:inkSource xml:id="inkSrc0">
+        <inkml:traceFormat>
+          <inkml:channel name="X" type="integer" max="27760" units="cm"/>
+          <inkml:channel name="Y" type="integer" max="15694" units="cm"/>
+          <inkml:channel name="F" type="integer" max="255" units="dev"/>
+          <inkml:channel name="T" type="integer" max="2.14748E9" units="dev"/>
+        </inkml:traceFormat>
+        <inkml:channelProperties>
+          <inkml:channelProperty channel="X" name="resolution" value="1000" units="1/cm"/>
+          <inkml:channelProperty channel="Y" name="resolution" value="1000.25494" units="1/cm"/>
+          <inkml:channelProperty channel="F" name="resolution" value="0" units="1/dev"/>
+          <inkml:channelProperty channel="T" name="resolution" value="1" units="1/dev"/>
+        </inkml:channelProperties>
+      </inkml:inkSource>
+      <inkml:timestamp xml:id="ts0" timeString="2015-11-04T18:53:37.014"/>
+    </inkml:context>
+    <inkml:brush xml:id="br0">
+      <inkml:brushProperty name="width" value="0.06667" units="cm"/>
+      <inkml:brushProperty name="height" value="0.06667" units="cm"/>
+      <inkml:brushProperty name="color" value="#ED1C24"/>
+      <inkml:brushProperty name="fitToCurve" value="1"/>
+    </inkml:brush>
+  </inkml:definitions>
+  <inkml:traceGroup>
+    <inkml:annotationXML>
+      <emma:emma xmlns:emma="http://www.w3.org/2003/04/emma" version="1.0">
+        <emma:interpretation id="{73381EAD-FA0B-4593-A6EB-FA4B8AA6BBE6}" emma:medium="tactile" emma:mode="ink">
+          <msink:context xmlns:msink="http://schemas.microsoft.com/ink/2010/main" type="inkDrawing" rotatedBoundingBox="22250,3414 24627,4042 24360,5054 21982,4425" semanticType="callout" shapeName="Other"/>
+        </emma:interpretation>
+      </emma:emma>
+    </inkml:annotationXML>
+    <inkml:trace contextRef="#ctx0" brushRef="#br0">414 315 36 0,'-33'-60'35'0,"14"9"1"15,-1-9-1-15,23 11-32 0,18 8-2 16,16 13-2-16,12 7 1 16,14 16-2-16,8 7 1 15,11 18-1-15,-5 12 1 16,-5 13 0-16,-14 15 0 15,-22 11 2-15,-23 12-1 16,-30 5 1-16,-24 4 0 16,-26-2 0-16,-21-8 1 0,-18-10 0 15,-6-7-1 1,-2-25 0-16,6-7 0 16,14-12 0-16,14-10-1 15,19-7 1-15,25 0-1 0,36-4 1 16,0 0-1-16,58 28 1 15,30-11 0-15,31 5 1 16,32 3 0-16,38 1 0 16,25-2 0-16,21-9-1 15,6 0-2-15,-4-13 0 16,-13-6-2-16,-15-5-1 16,-34-17-3-16,-27 5-6 15,-38-11-14-15,-34-11-9 16,-18 4 1-16,-32-16 1 15</inkml:trace>
+  </inkml:traceGroup>
+</inkml:ink>
+</file>
+
+<file path=ppt/ink/ink2.xml><?xml version="1.0" encoding="utf-8"?>
+<inkml:ink xmlns:inkml="http://www.w3.org/2003/InkML">
+  <inkml:definitions>
+    <inkml:context xml:id="ctx0">
+      <inkml:inkSource xml:id="inkSrc0">
+        <inkml:traceFormat>
+          <inkml:channel name="X" type="integer" max="27760" units="cm"/>
+          <inkml:channel name="Y" type="integer" max="15694" units="cm"/>
+          <inkml:channel name="F" type="integer" max="255" units="dev"/>
+          <inkml:channel name="T" type="integer" max="2.14748E9" units="dev"/>
+        </inkml:traceFormat>
+        <inkml:channelProperties>
+          <inkml:channelProperty channel="X" name="resolution" value="1000" units="1/cm"/>
+          <inkml:channelProperty channel="Y" name="resolution" value="1000.25494" units="1/cm"/>
+          <inkml:channelProperty channel="F" name="resolution" value="0" units="1/dev"/>
+          <inkml:channelProperty channel="T" name="resolution" value="1" units="1/dev"/>
+        </inkml:channelProperties>
+      </inkml:inkSource>
+      <inkml:timestamp xml:id="ts0" timeString="2015-11-04T18:51:23.203"/>
+    </inkml:context>
+    <inkml:brush xml:id="br0">
+      <inkml:brushProperty name="width" value="0.06667" units="cm"/>
+      <inkml:brushProperty name="height" value="0.06667" units="cm"/>
+      <inkml:brushProperty name="color" value="#ED1C24"/>
+      <inkml:brushProperty name="fitToCurve" value="1"/>
+    </inkml:brush>
+  </inkml:definitions>
+  <inkml:traceGroup>
+    <inkml:annotationXML>
+      <emma:emma xmlns:emma="http://www.w3.org/2003/04/emma" version="1.0">
+        <emma:interpretation id="{957FA57C-630A-4EEF-AC39-BA62B3253F86}" emma:medium="tactile" emma:mode="ink">
+          <msink:context xmlns:msink="http://schemas.microsoft.com/ink/2010/main" type="writingRegion" rotatedBoundingBox="14334,3141 16777,3141 16777,4467 14334,4467"/>
+        </emma:interpretation>
+      </emma:emma>
+    </inkml:annotationXML>
+    <inkml:traceGroup>
+      <inkml:annotationXML>
+        <emma:emma xmlns:emma="http://www.w3.org/2003/04/emma" version="1.0">
+          <emma:interpretation id="{540AA34C-1CEC-48E8-9695-98EFF2341147}" emma:medium="tactile" emma:mode="ink">
+            <msink:context xmlns:msink="http://schemas.microsoft.com/ink/2010/main" type="paragraph" rotatedBoundingBox="14334,3141 16777,3141 16777,4467 14334,4467" alignmentLevel="1"/>
+          </emma:interpretation>
+        </emma:emma>
+      </inkml:annotationXML>
+      <inkml:traceGroup>
+        <inkml:annotationXML>
+          <emma:emma xmlns:emma="http://www.w3.org/2003/04/emma" version="1.0">
+            <emma:interpretation id="{BE25B6FA-3B66-4C03-AF75-6D3A484662C2}" emma:medium="tactile" emma:mode="ink">
+              <msink:context xmlns:msink="http://schemas.microsoft.com/ink/2010/main" type="line" rotatedBoundingBox="14334,3141 16777,3141 16777,4467 14334,4467"/>
+            </emma:interpretation>
+          </emma:emma>
+        </inkml:annotationXML>
+        <inkml:traceGroup>
+          <inkml:annotationXML>
+            <emma:emma xmlns:emma="http://www.w3.org/2003/04/emma" version="1.0">
+              <emma:interpretation id="{AF4D1E7E-1429-4DCF-92C9-9AF72107958D}" emma:medium="tactile" emma:mode="ink">
+                <msink:context xmlns:msink="http://schemas.microsoft.com/ink/2010/main" type="inkWord" rotatedBoundingBox="14334,3141 16777,3141 16777,4467 14334,4467"/>
+              </emma:interpretation>
+              <emma:one-of disjunction-type="recognition" id="oneOf0">
+                <emma:interpretation id="interp0" emma:lang="en-US" emma:confidence="1">
+                  <emma:literal>2</emma:literal>
+                </emma:interpretation>
+                <emma:interpretation id="interp1" emma:lang="en-US" emma:confidence="0">
+                  <emma:literal>z</emma:literal>
+                </emma:interpretation>
+                <emma:interpretation id="interp2" emma:lang="en-US" emma:confidence="0">
+                  <emma:literal>Z</emma:literal>
+                </emma:interpretation>
+                <emma:interpretation id="interp3" emma:lang="en-US" emma:confidence="0">
+                  <emma:literal>L</emma:literal>
+                </emma:interpretation>
+                <emma:interpretation id="interp4" emma:lang="en-US" emma:confidence="0">
+                  <emma:literal>u</emma:literal>
+                </emma:interpretation>
+              </emma:one-of>
+            </emma:emma>
+          </inkml:annotationXML>
+          <inkml:trace contextRef="#ctx0" brushRef="#br0">0 202 2 0,'28'-53'11'0,"6"10"-5"0,14 6 1 16,12 9 1-16,7 3-1 15,8 14 1-15,9 7-1 16,9 14 0-1,2 10 0-15,2 10-2 0,-3 8-1 16,1 9-1-16,-9 5 0 16,-6 4 0-16,-15-3 0 15,-16 7 0-15,-21 5 1 16,-13 10 0-16,-25 2-1 16,-16 8 0-16,-17 3 0 15,-9 2-1-15,-10 2 0 16,-12 1 0-16,-8-12-1 15,-8-8-1-15,-5-20 1 0,0-10-1 16,-2-15 0-16,2-17 0 16,5-5-1-1,10-14 0-15,16-5 1 16,14-4 0-16,18 2-1 0,32 15 1 16,-5-28 0-16,36 26 0 15,22 0 1-15,25 4 0 16,25-2 0-16,27-2 0 15,23-3 2-15,19-3-1 16,9-5 0-16,9-4 0 16,-3-7 0-16,-4 1-1 15,-17 1 0-15,-17 5 1 16,-22 0 0-16,-19 2-2 16,-22 2 1-16,-19 4 0 15,-18 3-2-15,-16 2 1 0,-12 2-1 16,-21 2-1-1,20-7 0-15,-20 7-1 0,0 0-3 16,0 0-3-16,0 0-2 16,11-19-8-16,-1 0-14 15,31-1-1-15,2-25 17 16</inkml:trace>
+        </inkml:traceGroup>
+      </inkml:traceGroup>
+    </inkml:traceGroup>
+  </inkml:traceGroup>
+</inkml:ink>
+</file>
+
+<file path=ppt/ink/ink3.xml><?xml version="1.0" encoding="utf-8"?>
+<inkml:ink xmlns:inkml="http://www.w3.org/2003/InkML">
+  <inkml:definitions>
+    <inkml:context xml:id="ctx0">
+      <inkml:inkSource xml:id="inkSrc0">
+        <inkml:traceFormat>
+          <inkml:channel name="X" type="integer" max="27760" units="cm"/>
+          <inkml:channel name="Y" type="integer" max="15694" units="cm"/>
+          <inkml:channel name="F" type="integer" max="255" units="dev"/>
+          <inkml:channel name="T" type="integer" max="2.14748E9" units="dev"/>
+        </inkml:traceFormat>
+        <inkml:channelProperties>
+          <inkml:channelProperty channel="X" name="resolution" value="1000" units="1/cm"/>
+          <inkml:channelProperty channel="Y" name="resolution" value="1000.25494" units="1/cm"/>
+          <inkml:channelProperty channel="F" name="resolution" value="0" units="1/dev"/>
+          <inkml:channelProperty channel="T" name="resolution" value="1" units="1/dev"/>
+        </inkml:channelProperties>
+      </inkml:inkSource>
+      <inkml:timestamp xml:id="ts0" timeString="2015-11-04T18:51:23.875"/>
+    </inkml:context>
+    <inkml:brush xml:id="br0">
+      <inkml:brushProperty name="width" value="0.06667" units="cm"/>
+      <inkml:brushProperty name="height" value="0.06667" units="cm"/>
+      <inkml:brushProperty name="color" value="#ED1C24"/>
+      <inkml:brushProperty name="fitToCurve" value="1"/>
+    </inkml:brush>
+  </inkml:definitions>
+  <inkml:traceGroup>
+    <inkml:annotationXML>
+      <emma:emma xmlns:emma="http://www.w3.org/2003/04/emma" version="1.0">
+        <emma:interpretation id="{4FB39410-046F-4F03-AA2E-9E4EBD6FC004}" emma:medium="tactile" emma:mode="ink">
+          <msink:context xmlns:msink="http://schemas.microsoft.com/ink/2010/main" type="writingRegion" rotatedBoundingBox="22283,2635 24324,2635 24324,4947 22283,4947"/>
+        </emma:interpretation>
+      </emma:emma>
+    </inkml:annotationXML>
+    <inkml:traceGroup>
+      <inkml:annotationXML>
+        <emma:emma xmlns:emma="http://www.w3.org/2003/04/emma" version="1.0">
+          <emma:interpretation id="{AA9B3998-68B2-4402-BB3B-53370DB00217}" emma:medium="tactile" emma:mode="ink">
+            <msink:context xmlns:msink="http://schemas.microsoft.com/ink/2010/main" type="paragraph" rotatedBoundingBox="22283,2635 24324,2635 24324,4947 22283,4947" alignmentLevel="1"/>
+          </emma:interpretation>
+        </emma:emma>
+      </inkml:annotationXML>
+      <inkml:traceGroup>
+        <inkml:annotationXML>
+          <emma:emma xmlns:emma="http://www.w3.org/2003/04/emma" version="1.0">
+            <emma:interpretation id="{B62E76B2-1B2D-43DA-A43D-0D52686F8DB9}" emma:medium="tactile" emma:mode="ink">
+              <msink:context xmlns:msink="http://schemas.microsoft.com/ink/2010/main" type="line" rotatedBoundingBox="22283,2635 24324,2635 24324,4947 22283,4947"/>
+            </emma:interpretation>
+          </emma:emma>
+        </inkml:annotationXML>
+        <inkml:traceGroup>
+          <inkml:annotationXML>
+            <emma:emma xmlns:emma="http://www.w3.org/2003/04/emma" version="1.0">
+              <emma:interpretation id="{B7330941-EFBC-4FBE-B546-5D35ECA23762}" emma:medium="tactile" emma:mode="ink">
+                <msink:context xmlns:msink="http://schemas.microsoft.com/ink/2010/main" type="inkWord" rotatedBoundingBox="22283,2635 24324,2635 24324,4947 22283,4947"/>
+              </emma:interpretation>
+              <emma:one-of disjunction-type="recognition" id="oneOf0">
+                <emma:interpretation id="interp0" emma:lang="en-US" emma:confidence="1">
+                  <emma:literal>4</emma:literal>
+                </emma:interpretation>
+                <emma:interpretation id="interp1" emma:lang="en-US" emma:confidence="0">
+                  <emma:literal>&gt;</emma:literal>
+                </emma:interpretation>
+                <emma:interpretation id="interp2" emma:lang="en-US" emma:confidence="0">
+                  <emma:literal>G</emma:literal>
+                </emma:interpretation>
+                <emma:interpretation id="interp3" emma:lang="en-US" emma:confidence="0">
+                  <emma:literal>9</emma:literal>
+                </emma:interpretation>
+                <emma:interpretation id="interp4" emma:lang="en-US" emma:confidence="0">
+                  <emma:literal>g</emma:literal>
+                </emma:interpretation>
+              </emma:one-of>
+            </emma:emma>
+          </inkml:annotationXML>
+          <inkml:trace contextRef="#ctx0" brushRef="#br0">1163 41 1 0,'-28'-30'6'0,"28"30"19"16,-54-21-1-16,13 25-21 16,-4 16 0-16,-9 12-1 15,-7 17 2-15,-14 17-2 16,-7 16 1-16,-9 12 0 15,1 22-1-15,-7 12 0 16,2 8-1-16,0 3 0 16,11-8-2-16,15-14 3 15,15-12 0-15,20-19 0 0,23-15 1 16,24-22 1-16,30-19 0 16,31-19 0-16,22-5 0 15,21-10-1-15,21-2-1 16,13-7-1-16,10 0 0 15,3-6-1-15,0 6 1 16,-11-2-1-16,-5 2 0 16,-12 4 0-16,-15 1-1 15,-15 1-1-15,-20-3-3 16,-15 5-1-16,-22-8-5 16,-10 7-7-16,-39 6-5 15,11-39-5-15,-22 16 9 16</inkml:trace>
+          <inkml:trace contextRef="#ctx0" brushRef="#br0" timeOffset="360.2404">1255 631 27 0,'5'38'17'0,"-8"18"-1"16,3 23-1-16,-8 26-2 15,-1 30-2-15,-17 18-1 0,3 16-3 16,-12 0-2-16,3 0-1 16,-1-6-2-1,5-26 0-15,3-25 0 16,5-33-2-16,7-25 1 0,5-20-1 15,3-15 0-15,5-19-1 16,0 0 1-16,-21-15-1 16,8-10-1-16,-7-5-4 15,5-7-5-15,-6-10-11 16,-5-15-10-16,15-7-3 16,-4-19 14-16</inkml:trace>
+        </inkml:traceGroup>
+      </inkml:traceGroup>
+    </inkml:traceGroup>
+  </inkml:traceGroup>
+</inkml:ink>
+</file>
+
+<file path=ppt/ink/ink4.xml><?xml version="1.0" encoding="utf-8"?>
+<inkml:ink xmlns:inkml="http://www.w3.org/2003/InkML">
+  <inkml:definitions>
+    <inkml:context xml:id="ctx0">
+      <inkml:inkSource xml:id="inkSrc0">
+        <inkml:traceFormat>
+          <inkml:channel name="X" type="integer" max="27760" units="cm"/>
+          <inkml:channel name="Y" type="integer" max="15694" units="cm"/>
+          <inkml:channel name="F" type="integer" max="255" units="dev"/>
+          <inkml:channel name="T" type="integer" max="2.14748E9" units="dev"/>
+        </inkml:traceFormat>
+        <inkml:channelProperties>
+          <inkml:channelProperty channel="X" name="resolution" value="1000" units="1/cm"/>
+          <inkml:channelProperty channel="Y" name="resolution" value="1000.25494" units="1/cm"/>
+          <inkml:channelProperty channel="F" name="resolution" value="0" units="1/dev"/>
+          <inkml:channelProperty channel="T" name="resolution" value="1" units="1/dev"/>
+        </inkml:channelProperties>
+      </inkml:inkSource>
+      <inkml:timestamp xml:id="ts0" timeString="2015-11-04T18:51:33.603"/>
+    </inkml:context>
+    <inkml:brush xml:id="br0">
+      <inkml:brushProperty name="width" value="0.06667" units="cm"/>
+      <inkml:brushProperty name="height" value="0.06667" units="cm"/>
+      <inkml:brushProperty name="color" value="#ED1C24"/>
+      <inkml:brushProperty name="fitToCurve" value="1"/>
+    </inkml:brush>
+  </inkml:definitions>
+  <inkml:traceGroup>
+    <inkml:annotationXML>
+      <emma:emma xmlns:emma="http://www.w3.org/2003/04/emma" version="1.0">
+        <emma:interpretation id="{CF3478AF-1758-4590-AB33-D62A255AAFBA}" emma:medium="tactile" emma:mode="ink">
+          <msink:context xmlns:msink="http://schemas.microsoft.com/ink/2010/main" type="writingRegion" rotatedBoundingBox="2749,9571 3105,15739 777,15873 420,9705"/>
+        </emma:interpretation>
+      </emma:emma>
+    </inkml:annotationXML>
+    <inkml:traceGroup>
+      <inkml:annotationXML>
+        <emma:emma xmlns:emma="http://www.w3.org/2003/04/emma" version="1.0">
+          <emma:interpretation id="{764A1E16-D090-4AF6-AAC6-C033FD88349B}" emma:medium="tactile" emma:mode="ink">
+            <msink:context xmlns:msink="http://schemas.microsoft.com/ink/2010/main" type="paragraph" rotatedBoundingBox="2749,9571 3105,15739 777,15873 420,9705" alignmentLevel="1"/>
+          </emma:interpretation>
+        </emma:emma>
+      </inkml:annotationXML>
+      <inkml:traceGroup>
+        <inkml:annotationXML>
+          <emma:emma xmlns:emma="http://www.w3.org/2003/04/emma" version="1.0">
+            <emma:interpretation id="{D8FBD8AB-EDFC-4F47-99CD-596DBFC680A9}" emma:medium="tactile" emma:mode="ink">
+              <msink:context xmlns:msink="http://schemas.microsoft.com/ink/2010/main" type="line" rotatedBoundingBox="2749,9571 3105,15739 777,15873 420,9705"/>
+            </emma:interpretation>
+          </emma:emma>
+        </inkml:annotationXML>
+        <inkml:traceGroup>
+          <inkml:annotationXML>
+            <emma:emma xmlns:emma="http://www.w3.org/2003/04/emma" version="1.0">
+              <emma:interpretation id="{EFF0C204-DD0A-45F9-917E-6D40095BF19C}" emma:medium="tactile" emma:mode="ink">
+                <msink:context xmlns:msink="http://schemas.microsoft.com/ink/2010/main" type="inkWord" rotatedBoundingBox="2749,9571 3105,15739 777,15873 420,9705"/>
+              </emma:interpretation>
+              <emma:one-of disjunction-type="recognition" id="oneOf0">
+                <emma:interpretation id="interp0" emma:lang="en-US" emma:confidence="0">
+                  <emma:literal>is</emma:literal>
+                </emma:interpretation>
+                <emma:interpretation id="interp1" emma:lang="en-US" emma:confidence="0">
+                  <emma:literal>5</emma:literal>
+                </emma:interpretation>
+                <emma:interpretation id="interp2" emma:lang="en-US" emma:confidence="0">
+                  <emma:literal>§</emma:literal>
+                </emma:interpretation>
+                <emma:interpretation id="interp3" emma:lang="en-US" emma:confidence="0">
+                  <emma:literal>s</emma:literal>
+                </emma:interpretation>
+                <emma:interpretation id="interp4" emma:lang="en-US" emma:confidence="0">
+                  <emma:literal>so</emma:literal>
+                </emma:interpretation>
+              </emma:one-of>
+            </emma:emma>
+          </inkml:annotationXML>
+          <inkml:trace contextRef="#ctx0" brushRef="#br0">791 0 1 0,'0'0'27'15,"-5"36"1"-15,-23-10-1 16,-2 21-25-16,2 15 1 15,0 22-1-15,-2 12-1 16,-2 16-1-16,1 5 0 16,6-3 1-16,3-9-1 15,9-17 0-15,5-9 0 16,3-19 3-16,10-19 0 16,3-17 0-16,12-9 1 0,3-18-1 15,18-3 1-15,4-7-1 16,18 0-1-16,10-6-1 15,11 6-1-15,7 13 0 16,4 6 0-16,-3 16 1 16,-3 12-1-16,-1 11 1 15,-8 15 1-15,-16 9 1 16,-10 6 0-16,-17 2 1 16,-7-2 1-16,-28-9 0 15,-6 1-1-15,-26-7 1 16,-13 4-1-16,-20-12-1 15,-12 3 0-15,-16-14-2 0,-14-5 0 16,-10-3-3-16,-7-16-1 16,-10-7-1-16,-10-25-5 15,6-2-6-15,-8-19-13 16,4-20-8-16,15 5 0 16,2-26 7-16</inkml:trace>
+          <inkml:trace contextRef="#ctx0" brushRef="#br0" timeOffset="352.2364">301-5 2 0,'26'-15'31'0,"9"9"1"16,-35 6-1-16,45-36-21 16,-4 27-2-16,13-4-1 15,15 11-1-15,17-7-2 16,15-6 0-16,14-4-2 16,16-2 1-16,13-9-2 15,7-7 0-15,-2-6 0 16,-3-2 0-16,-10 5-1 15,-11 8-2-15,-17 6 1 0,-24 2-4 16,-15 18-3-16,-24-3-6 16,-12 20-9-16,-16 8-8 15,-24 1-3 1,-1 25 9-16</inkml:trace>
+          <inkml:trace contextRef="#ctx0" brushRef="#br0" timeOffset="1660.1124">1659 3819 1 0,'-39'17'14'0,"3"21"13"16,-29-1 0-16,-8 21-16 15,-18 10-8-15,-1 5-1 16,3 6 0-16,1-8 0 16,12-7-2-16,14-14 0 15,17-16 1-15,21-28-1 16,24-6 0-16,17-36-1 15,18-7 0-15,16-13 1 16,12 3 1-16,6-9 1 16,6 4 0-16,3 4 0 15,-1 7 0-15,-10 15 0 0,-4 17 0 16,-14 11-1-16,-3 19 0 16,-16 21 0-16,-7 20-1 15,-12 25 2-15,-4 33 0 16,-9 23 1-16,-1 17 0 15,-3 11 0-15,6 0 0 16,0-2-2-16,2-15-1 16,7-11-4-16,-7-32-3 15,6-23-3-15,-12-25-1 16,0-16-2-16,-16-15-1 16,-3-7 2-16,-14-8 2 15,-6-5 4-15,-7 5 2 16,-3 0 3-16,3 4 1 0,-4 4 2 15,5-2 0-15,-1-2-2 16,-2 0-2-16,-2-2 0 16,-4-9 0-1,-4 3 2-15,-7 1 2 0,0-3 2 16,0 1 1-16,0-4 3 16,6 7 2-16,3-7 0 15,11 7 1-15,3-9-2 16,12-3 0-16,1-3-1 15,14 4-2-15,0-7 0 16,19 9 0-16,0 0-1 16,2-23 1-16,26 6-1 15,24 2 0-15,23-5-1 0,22 1 0 16,24-5 1 0,19 1-1-16,17-3-1 15,9 9 1-15,2-7 0 16,-2 5-1-16,-11 0-1 0,-8 4 0 15,-16 0 0-15,-12 4 0 16,-25 5-1-16,-14-3 0 16,-19 7 0-16,-14 2-1 15,-19 6-1-15,-28-6 0 16,24 11-2-16,-24-11-1 16,-20 4-3-16,-6-14-5 15,5 10-14-15,-1-7-12 16,-25-21 0-16,-3-10 0 0</inkml:trace>
+        </inkml:traceGroup>
+      </inkml:traceGroup>
+    </inkml:traceGroup>
+  </inkml:traceGroup>
+</inkml:ink>
+</file>
+
+<file path=ppt/ink/ink5.xml><?xml version="1.0" encoding="utf-8"?>
+<inkml:ink xmlns:inkml="http://www.w3.org/2003/InkML">
+  <inkml:definitions>
+    <inkml:context xml:id="ctx0">
+      <inkml:inkSource xml:id="inkSrc0">
+        <inkml:traceFormat>
+          <inkml:channel name="X" type="integer" max="27760" units="cm"/>
+          <inkml:channel name="Y" type="integer" max="15694" units="cm"/>
+          <inkml:channel name="F" type="integer" max="255" units="dev"/>
+          <inkml:channel name="T" type="integer" max="2.14748E9" units="dev"/>
+        </inkml:traceFormat>
+        <inkml:channelProperties>
+          <inkml:channelProperty channel="X" name="resolution" value="1000" units="1/cm"/>
+          <inkml:channelProperty channel="Y" name="resolution" value="1000.25494" units="1/cm"/>
+          <inkml:channelProperty channel="F" name="resolution" value="0" units="1/dev"/>
+          <inkml:channelProperty channel="T" name="resolution" value="1" units="1/dev"/>
+        </inkml:channelProperties>
+      </inkml:inkSource>
+      <inkml:timestamp xml:id="ts0" timeString="2015-11-04T18:52:01.026"/>
+    </inkml:context>
+    <inkml:brush xml:id="br0">
+      <inkml:brushProperty name="width" value="0.06667" units="cm"/>
+      <inkml:brushProperty name="height" value="0.06667" units="cm"/>
+      <inkml:brushProperty name="color" value="#ED1C24"/>
+      <inkml:brushProperty name="fitToCurve" value="1"/>
+    </inkml:brush>
+  </inkml:definitions>
+  <inkml:traceGroup>
+    <inkml:annotationXML>
+      <emma:emma xmlns:emma="http://www.w3.org/2003/04/emma" version="1.0">
+        <emma:interpretation id="{0E91DAE2-A03F-46B0-9C72-45BAE479DEDF}" emma:medium="tactile" emma:mode="ink">
+          <msink:context xmlns:msink="http://schemas.microsoft.com/ink/2010/main" type="writingRegion" rotatedBoundingBox="14364,3298 16252,3298 16252,5152 14364,5152"/>
+        </emma:interpretation>
+      </emma:emma>
+    </inkml:annotationXML>
+    <inkml:traceGroup>
+      <inkml:annotationXML>
+        <emma:emma xmlns:emma="http://www.w3.org/2003/04/emma" version="1.0">
+          <emma:interpretation id="{C831D921-CFDB-4DC0-8521-F4F31E478955}" emma:medium="tactile" emma:mode="ink">
+            <msink:context xmlns:msink="http://schemas.microsoft.com/ink/2010/main" type="paragraph" rotatedBoundingBox="14364,3298 16252,3298 16252,5152 14364,5152" alignmentLevel="1"/>
+          </emma:interpretation>
+        </emma:emma>
+      </inkml:annotationXML>
+      <inkml:traceGroup>
+        <inkml:annotationXML>
+          <emma:emma xmlns:emma="http://www.w3.org/2003/04/emma" version="1.0">
+            <emma:interpretation id="{35C8DEBA-2FCF-47FA-91E6-76B3791B14D9}" emma:medium="tactile" emma:mode="ink">
+              <msink:context xmlns:msink="http://schemas.microsoft.com/ink/2010/main" type="line" rotatedBoundingBox="14364,3298 16252,3298 16252,5152 14364,5152"/>
+            </emma:interpretation>
+          </emma:emma>
+        </inkml:annotationXML>
+        <inkml:traceGroup>
+          <inkml:annotationXML>
+            <emma:emma xmlns:emma="http://www.w3.org/2003/04/emma" version="1.0">
+              <emma:interpretation id="{2C1288C2-835E-4358-A2F2-2FBD6450F316}" emma:medium="tactile" emma:mode="ink">
+                <msink:context xmlns:msink="http://schemas.microsoft.com/ink/2010/main" type="inkWord" rotatedBoundingBox="14364,3298 16252,3298 16252,5152 14364,5152"/>
+              </emma:interpretation>
+              <emma:one-of disjunction-type="recognition" id="oneOf0">
+                <emma:interpretation id="interp0" emma:lang="en-US" emma:confidence="1">
+                  <emma:literal>3</emma:literal>
+                </emma:interpretation>
+                <emma:interpretation id="interp1" emma:lang="en-US" emma:confidence="0">
+                  <emma:literal>Z</emma:literal>
+                </emma:interpretation>
+                <emma:interpretation id="interp2" emma:lang="en-US" emma:confidence="0">
+                  <emma:literal>}</emma:literal>
+                </emma:interpretation>
+                <emma:interpretation id="interp3" emma:lang="en-US" emma:confidence="0">
+                  <emma:literal>,</emma:literal>
+                </emma:interpretation>
+                <emma:interpretation id="interp4" emma:lang="en-US" emma:confidence="0">
+                  <emma:literal>]</emma:literal>
+                </emma:interpretation>
+              </emma:one-of>
+            </emma:emma>
+          </inkml:annotationXML>
+          <inkml:trace contextRef="#ctx0" brushRef="#br0">40 405 1 0,'8'-50'0'0,"7"31"24"15,-8-15 3-15,19 8-20 16,2 0-3-16,8 9-1 15,16 0-1-15,17-4-2 16,13-3 1-16,15 3-1 0,13-3 2 16,15-4 0-16,11 7 1 15,2-3 0-15,6 5 1 16,-6 6 0 0,-5 7 0-16,-14 1 0 0,-7 10-1 15,-24 3 0-15,-12 9-2 16,-20 7 1-16,-17 6-2 15,-26 4 1-15,-22 5-1 16,-19 4 1-16,-24 4-1 16,-19-2 0-16,-13 4 1 15,-15-4-1-15,-11 0 0 16,0 4 0-16,0-6 0 16,9 0 0-16,10-4 0 0,22-1-1 15,16-1 1-15,27-5 0 16,26-2-1-16,34 0 1 15,27 0 0-15,25 6-1 16,17 5 0-16,11 8 1 16,3 3 0-16,-5 3 1 15,-11 5 0-15,-21-2 1 16,-22 7 0-16,-28-1 2 16,-19 4 0-16,-33 1-1 15,-23 2 1-15,-28-3 0 16,-24 5 0-16,-24-11 0 15,-15 5 0-15,-14-24-2 16,-8-9 0-16,1-19 1 0,8-13-2 16,9-11 0-16,17-10-1 15,13-2 1 1,18-11-1-16,21 6-1 16,15-2-1-16,13 11-2 0,10-5-3 15,33 22-6-15,-6-36-11 16,27 4-12-16,33 2-1 15,13-22 12-15</inkml:trace>
+        </inkml:traceGroup>
+      </inkml:traceGroup>
+    </inkml:traceGroup>
+  </inkml:traceGroup>
+</inkml:ink>
+</file>
+
+<file path=ppt/ink/ink6.xml><?xml version="1.0" encoding="utf-8"?>
+<inkml:ink xmlns:inkml="http://www.w3.org/2003/InkML">
+  <inkml:definitions>
+    <inkml:context xml:id="ctx0">
+      <inkml:inkSource xml:id="inkSrc0">
+        <inkml:traceFormat>
+          <inkml:channel name="X" type="integer" max="27760" units="cm"/>
+          <inkml:channel name="Y" type="integer" max="15694" units="cm"/>
+          <inkml:channel name="F" type="integer" max="255" units="dev"/>
+          <inkml:channel name="T" type="integer" max="2.14748E9" units="dev"/>
+        </inkml:traceFormat>
+        <inkml:channelProperties>
+          <inkml:channelProperty channel="X" name="resolution" value="1000" units="1/cm"/>
+          <inkml:channelProperty channel="Y" name="resolution" value="1000.25494" units="1/cm"/>
+          <inkml:channelProperty channel="F" name="resolution" value="0" units="1/dev"/>
+          <inkml:channelProperty channel="T" name="resolution" value="1" units="1/dev"/>
+        </inkml:channelProperties>
+      </inkml:inkSource>
+      <inkml:timestamp xml:id="ts0" timeString="2015-11-04T18:52:02.071"/>
+    </inkml:context>
+    <inkml:brush xml:id="br0">
+      <inkml:brushProperty name="width" value="0.06667" units="cm"/>
+      <inkml:brushProperty name="height" value="0.06667" units="cm"/>
+      <inkml:brushProperty name="color" value="#ED1C24"/>
+      <inkml:brushProperty name="fitToCurve" value="1"/>
+    </inkml:brush>
+  </inkml:definitions>
+  <inkml:trace contextRef="#ctx0" brushRef="#br0">259 222 29 0,'-26'-15'13'0,"26"15"0"16,-13-26 0-16,13 26-2 15,11-30-1-15,4 7-4 16,9 8 0-16,8-11-3 15,11 5 0-15,7-3-1 16,10 5 0-16,0 6-1 16,5 4 0-16,-1 11-1 15,1 7 0-15,-7 10 0 16,-10 7 0-16,-5 15 0 0,-11 4-1 16,-12 4 2-16,-12 5-1 15,-16-3 1-15,-14 5 0 16,-17-1 0-1,-8-1-1-15,-14-5 1 0,-1 3 0 16,-1-7-1-16,5-5-1 16,11-5 1-16,15-10-1 15,23-3 0-15,20-3 0 16,25-2 0-16,25-2 1 16,23 7 0-16,15 3 1 15,11 10 0-15,8 10 0 16,-6 4 0-16,-2 7 1 15,-15 0 0-15,-15-3 1 0,-24 3 0 16,-20 0 1-16,-23-3 0 16,-19 9 2-16,-29-8-1 15,-23 2 1-15,-24-5-2 16,-15 7 0-16,-17-9-1 16,-11-2-1-16,-6-10-1 15,10-12-2-15,3-3 0 16,14-14-1-16,16-1 0 15,8-16-2-15,18 1-4 16,-1-16-7-16,13-2-22 16,1 7 2-16,-7-13-2 15,4 13 14-15</inkml:trace>
+</inkml:ink>
+</file>
+
+<file path=ppt/ink/ink7.xml><?xml version="1.0" encoding="utf-8"?>
+<inkml:ink xmlns:inkml="http://www.w3.org/2003/InkML">
+  <inkml:definitions>
+    <inkml:context xml:id="ctx0">
+      <inkml:inkSource xml:id="inkSrc0">
+        <inkml:traceFormat>
+          <inkml:channel name="X" type="integer" max="27760" units="cm"/>
+          <inkml:channel name="Y" type="integer" max="15694" units="cm"/>
+          <inkml:channel name="F" type="integer" max="255" units="dev"/>
+          <inkml:channel name="T" type="integer" max="2.14748E9" units="dev"/>
+        </inkml:traceFormat>
+        <inkml:channelProperties>
+          <inkml:channelProperty channel="X" name="resolution" value="1000" units="1/cm"/>
+          <inkml:channelProperty channel="Y" name="resolution" value="1000.25494" units="1/cm"/>
+          <inkml:channelProperty channel="F" name="resolution" value="0" units="1/dev"/>
+          <inkml:channelProperty channel="T" name="resolution" value="1" units="1/dev"/>
+        </inkml:channelProperties>
+      </inkml:inkSource>
+      <inkml:timestamp xml:id="ts0" timeString="2015-11-04T18:52:17.287"/>
+    </inkml:context>
+    <inkml:brush xml:id="br0">
+      <inkml:brushProperty name="width" value="0.06667" units="cm"/>
+      <inkml:brushProperty name="height" value="0.06667" units="cm"/>
+      <inkml:brushProperty name="color" value="#ED1C24"/>
+      <inkml:brushProperty name="fitToCurve" value="1"/>
+    </inkml:brush>
+  </inkml:definitions>
+  <inkml:traceGroup>
+    <inkml:annotationXML>
+      <emma:emma xmlns:emma="http://www.w3.org/2003/04/emma" version="1.0">
+        <emma:interpretation id="{37B750E3-4D8B-473B-98D0-99747AF3551B}" emma:medium="tactile" emma:mode="ink">
+          <msink:context xmlns:msink="http://schemas.microsoft.com/ink/2010/main" type="writingRegion" rotatedBoundingBox="637,15411 754,9697 2842,9740 2726,15454"/>
+        </emma:interpretation>
+      </emma:emma>
+    </inkml:annotationXML>
+    <inkml:traceGroup>
+      <inkml:annotationXML>
+        <emma:emma xmlns:emma="http://www.w3.org/2003/04/emma" version="1.0">
+          <emma:interpretation id="{8E129038-2A97-4C97-8D07-0427ECFCC87D}" emma:medium="tactile" emma:mode="ink">
+            <msink:context xmlns:msink="http://schemas.microsoft.com/ink/2010/main" type="paragraph" rotatedBoundingBox="637,15411 754,9697 2842,9740 2726,15454" alignmentLevel="1"/>
+          </emma:interpretation>
+        </emma:emma>
+      </inkml:annotationXML>
+      <inkml:traceGroup>
+        <inkml:annotationXML>
+          <emma:emma xmlns:emma="http://www.w3.org/2003/04/emma" version="1.0">
+            <emma:interpretation id="{3AFBD913-C8F0-436F-B9C4-824CB95CBE45}" emma:medium="tactile" emma:mode="ink">
+              <msink:context xmlns:msink="http://schemas.microsoft.com/ink/2010/main" type="line" rotatedBoundingBox="637,15411 754,9697 2842,9740 2726,15454"/>
+            </emma:interpretation>
+          </emma:emma>
+        </inkml:annotationXML>
+        <inkml:traceGroup>
+          <inkml:annotationXML>
+            <emma:emma xmlns:emma="http://www.w3.org/2003/04/emma" version="1.0">
+              <emma:interpretation id="{2301DA11-45D2-4AB6-91C4-BC1510784BE7}" emma:medium="tactile" emma:mode="ink">
+                <msink:context xmlns:msink="http://schemas.microsoft.com/ink/2010/main" type="inkWord" rotatedBoundingBox="637,15411 754,9697 2842,9740 2726,15454"/>
+              </emma:interpretation>
+              <emma:one-of disjunction-type="recognition" id="oneOf0">
+                <emma:interpretation id="interp0" emma:lang="en-US" emma:confidence="0">
+                  <emma:literal>¥</emma:literal>
+                </emma:interpretation>
+                <emma:interpretation id="interp1" emma:lang="en-US" emma:confidence="0">
+                  <emma:literal>l</emma:literal>
+                </emma:interpretation>
+                <emma:interpretation id="interp2" emma:lang="en-US" emma:confidence="0">
+                  <emma:literal>}</emma:literal>
+                </emma:interpretation>
+                <emma:interpretation id="interp3" emma:lang="en-US" emma:confidence="0">
+                  <emma:literal>y</emma:literal>
+                </emma:interpretation>
+                <emma:interpretation id="interp4" emma:lang="en-US" emma:confidence="0">
+                  <emma:literal>1</emma:literal>
+                </emma:interpretation>
+              </emma:one-of>
+            </emma:emma>
+          </inkml:annotationXML>
+          <inkml:trace contextRef="#ctx0" brushRef="#br0">297 3947 22 0,'19'-8'15'0,"-19"8"-1"0,22-2-3 15,-22 2-2-15,0 38-3 16,-11 5-2-16,-6 15-1 16,-5 13-1-16,-1 4 1 15,-5 6 0-15,0 7 0 16,4-6 1-16,0-18-1 16,11-8 2-16,2-18-1 15,5-10 0-15,2-9 0 16,4-19-1-16,0 0-1 15,23 9 1-15,-23-9-1 16,35-9-1-16,-7 5 0 16,6 4 0-16,9 6 0 15,11 9-1-15,11 5 0 0,10 8 0 16,5 6 1-16,6 9-1 16,3 4 1-16,-3 4 0 15,-9-4 1 1,-3 5 0-16,-20 1 1 0,-9 3 0 15,-19-2 0-15,-15 4 0 16,-22-1 1-16,-11 8-1 16,-21-1 0-16,-17 9-1 15,-18-17 0-15,-14-5 0 16,-18-8-1-16,-9-9 0 16,-6-10-1-16,-13-20-2 15,0-8-1-15,-2-26-4 16,15 6-7-16,-4-17-8 0,17-8-15 15,13-2 0-15,8-14 1 16</inkml:trace>
+          <inkml:trace contextRef="#ctx0" brushRef="#br0" timeOffset="-467.3127">-147 4082 1 0,'47'22'1'0,"-25"-33"14"16,17-2-18-16,0 5-6 15,-1-7 5-15</inkml:trace>
+          <inkml:trace contextRef="#ctx0" brushRef="#br0" timeOffset="359.2445">-153 4365 4 0,'43'24'30'16,"-22"-26"0"-16,5-5-13 16,11 3 0-16,-1-13-2 15,16 6-3-15,-2-12-2 16,19 3-1-16,0-12-2 0,19 6-2 15,7-12 0-15,19 4-1 16,11-5-1-16,9 7 0 16,3-2-1-16,-3 4-1 15,-7 4-1-15,-15 4 0 16,-17 12 0-16,-20-3-3 16,-21 11 0-16,-19-3-3 15,-11 23-8-15,-24-18-23 16,-5 27-1-16,-1-5 1 15,-18-20 2-15</inkml:trace>
+          <inkml:trace contextRef="#ctx0" brushRef="#br0" timeOffset="-744.4983">0 926 15 0,'53'-105'11'0,"6"-5"0"0,1-5 0 16,-2 1-1-16,2 9-2 15,5 4-2-15,4 16-3 16,-6 14-2-16,-1 15-1 15,-8 16-1-15,-2 18 0 16,-14 20 0-16,-7 21 0 16,-16 26 2-16,-13 26 0 15,-13 30 1-15,-10 32 1 16,-10 27 2-16,-1 20-1 0,0 13 0 16,2 9-1-1,4-10 0-15,6-7 0 16,14-31-1-16,6-27 0 15,13-33-3-15,6-30 1 0,3-21-2 16,1-26-1-16,-1-13 1 16,0-16-1-16,-22 12-1 15,25-39 1-15,-25 39-2 16,-4-34 1-16,4 34-1 16,-37-9 2-16,12 16-1 15,-8 3 1-15,-3 1 0 16,-5 4 1-16,0 2 1 15,-2 5 2-15,-3-10 0 16,3-1 0-16,0-4 1 16,2-3 0-16,0 2 0 15,9-4 0-15,2-6 0 16,8 4 1-16,3-6 0 0,19 6 0 16,-24-9 1-16,24 9-1 15,0 0 0-15,0 0 1 16,-21-15-1-16,21 15 0 15,0 0 0-15,34-26 1 16,3 11 0-16,17 3 0 16,15-8 1-16,23 10-1 15,12-3 0-15,16 8 0 16,5 3-1-16,2 11-2 16,-2 2-1-16,-8 1-1 15,-9 8-3-15,-27-7-3 16,-7 6-3-16,-29-11-5 15,-13 10-7-15,-32-18-6 0,0 0-3 16,-30 34 15-16</inkml:trace>
+        </inkml:traceGroup>
+      </inkml:traceGroup>
+    </inkml:traceGroup>
+  </inkml:traceGroup>
+</inkml:ink>
+</file>
+
+<file path=ppt/ink/ink8.xml><?xml version="1.0" encoding="utf-8"?>
+<inkml:ink xmlns:inkml="http://www.w3.org/2003/InkML">
+  <inkml:definitions>
+    <inkml:context xml:id="ctx0">
+      <inkml:inkSource xml:id="inkSrc0">
+        <inkml:traceFormat>
+          <inkml:channel name="X" type="integer" max="27760" units="cm"/>
+          <inkml:channel name="Y" type="integer" max="15694" units="cm"/>
+          <inkml:channel name="F" type="integer" max="255" units="dev"/>
+          <inkml:channel name="T" type="integer" max="2.14748E9" units="dev"/>
+        </inkml:traceFormat>
+        <inkml:channelProperties>
+          <inkml:channelProperty channel="X" name="resolution" value="1000" units="1/cm"/>
+          <inkml:channelProperty channel="Y" name="resolution" value="1000.25494" units="1/cm"/>
+          <inkml:channelProperty channel="F" name="resolution" value="0" units="1/dev"/>
+          <inkml:channelProperty channel="T" name="resolution" value="1" units="1/dev"/>
+        </inkml:channelProperties>
+      </inkml:inkSource>
+      <inkml:timestamp xml:id="ts0" timeString="2015-11-04T18:52:32.459"/>
+    </inkml:context>
+    <inkml:brush xml:id="br0">
+      <inkml:brushProperty name="width" value="0.06667" units="cm"/>
+      <inkml:brushProperty name="height" value="0.06667" units="cm"/>
+      <inkml:brushProperty name="color" value="#ED1C24"/>
+      <inkml:brushProperty name="fitToCurve" value="1"/>
+    </inkml:brush>
+  </inkml:definitions>
+  <inkml:traceGroup>
+    <inkml:annotationXML>
+      <emma:emma xmlns:emma="http://www.w3.org/2003/04/emma" version="1.0">
+        <emma:interpretation id="{C5EFA69C-6FE6-4802-96DF-B6F61F9003D2}" emma:medium="tactile" emma:mode="ink">
+          <msink:context xmlns:msink="http://schemas.microsoft.com/ink/2010/main" type="writingRegion" rotatedBoundingBox="15047,2943 24444,3262 24380,5144 14984,4825"/>
+        </emma:interpretation>
+      </emma:emma>
+    </inkml:annotationXML>
+    <inkml:traceGroup>
+      <inkml:annotationXML>
+        <emma:emma xmlns:emma="http://www.w3.org/2003/04/emma" version="1.0">
+          <emma:interpretation id="{489A7AB3-26DE-4EB1-A654-EA812540B227}" emma:medium="tactile" emma:mode="ink">
+            <msink:context xmlns:msink="http://schemas.microsoft.com/ink/2010/main" type="paragraph" rotatedBoundingBox="15047,2943 24444,3262 24380,5144 14984,4825" alignmentLevel="1"/>
+          </emma:interpretation>
+        </emma:emma>
+      </inkml:annotationXML>
+      <inkml:traceGroup>
+        <inkml:annotationXML>
+          <emma:emma xmlns:emma="http://www.w3.org/2003/04/emma" version="1.0">
+            <emma:interpretation id="{09653EEC-733A-41D9-9965-ACE5B6E82525}" emma:medium="tactile" emma:mode="ink">
+              <msink:context xmlns:msink="http://schemas.microsoft.com/ink/2010/main" type="line" rotatedBoundingBox="15047,2943 24444,3262 24380,5144 14984,4825"/>
+            </emma:interpretation>
+          </emma:emma>
+        </inkml:annotationXML>
+        <inkml:traceGroup>
+          <inkml:annotationXML>
+            <emma:emma xmlns:emma="http://www.w3.org/2003/04/emma" version="1.0">
+              <emma:interpretation id="{3F4C328C-60F9-4FB7-AF2A-CECB2E959440}" emma:medium="tactile" emma:mode="ink">
+                <msink:context xmlns:msink="http://schemas.microsoft.com/ink/2010/main" type="inkWord" rotatedBoundingBox="15047,2943 17007,3010 16943,4892 14984,4825"/>
+              </emma:interpretation>
+              <emma:one-of disjunction-type="recognition" id="oneOf0">
+                <emma:interpretation id="interp0" emma:lang="en-US" emma:confidence="1">
+                  <emma:literal>4</emma:literal>
+                </emma:interpretation>
+                <emma:interpretation id="interp1" emma:lang="en-US" emma:confidence="0">
+                  <emma:literal>S</emma:literal>
+                </emma:interpretation>
+                <emma:interpretation id="interp2" emma:lang="en-US" emma:confidence="0">
+                  <emma:literal>*</emma:literal>
+                </emma:interpretation>
+                <emma:interpretation id="interp3" emma:lang="en-US" emma:confidence="0">
+                  <emma:literal>&gt;</emma:literal>
+                </emma:interpretation>
+                <emma:interpretation id="interp4" emma:lang="en-US" emma:confidence="0">
+                  <emma:literal>¢</emma:literal>
+                </emma:interpretation>
+              </emma:one-of>
+            </emma:emma>
+          </inkml:annotationXML>
+          <inkml:trace contextRef="#ctx0" brushRef="#br0">588 379 1 0,'31'-70'0'16,"10"8"26"-16,-18-18-1 16,1 16-21-16,4 17-2 15,-4 15 0-15,-3 12-1 16,-21 20-1-16,28-4 0 15,-28 4 2-15,7 39-1 16,-18-7 1-16,-6 17 1 16,-18 5 0-16,-14 12 0 15,-18 9 0-15,-9 11 0 16,-10 0-1-16,-6 12 1 16,-5-8-1-16,8 0-1 15,12-8 1-15,18-10-2 0,21-9 1 16,20-12 0-16,23-8 1 15,23-20 0-15,23-10 0 16,27-2 2 0,13-9-1-16,18-2 0 0,14 2 1 15,15-4-1-15,7 2-1 16,8 2-1-16,0 5 0 16,-5-7-1-16,-8 2 1 15,-13-4-1-15,-8-9 0 16,-13-4 0-16,-20-11-1 15,-19-10 0-15,-18-9-3 16,-16-4-1-16,-16-1-3 0,-24-5-6 16,-12 5-5-16,-20 3-5 15,-19 4-7 1,-2 11 18-16</inkml:trace>
+          <inkml:trace contextRef="#ctx0" brushRef="#br0" timeOffset="259.1736">802 497 13 0,'-9'43'15'0,"1"13"-2"16,-1 27-2-16,-4 22-2 16,-2 22 1-16,-2 12-4 15,-3 11-3-15,3 0-1 16,-2-8 0-16,1-16-1 15,1-25 1-15,4-22 1 16,0-27-1-16,0-25 1 0,13-27-2 16,-34-8 0-16,14-18-5 15,-8-15-9-15,-8-19-17 16,4 9-1-16,-16-20 13 16</inkml:trace>
+        </inkml:traceGroup>
+        <inkml:traceGroup>
+          <inkml:annotationXML>
+            <emma:emma xmlns:emma="http://www.w3.org/2003/04/emma" version="1.0">
+              <emma:interpretation id="{520A613F-0282-4A1E-A41E-90F58D2F3F11}" emma:medium="tactile" emma:mode="ink">
+                <msink:context xmlns:msink="http://schemas.microsoft.com/ink/2010/main" type="inkWord" rotatedBoundingBox="21861,3592 24430,3680 24403,4465 21834,4378"/>
+              </emma:interpretation>
+              <emma:one-of disjunction-type="recognition" id="oneOf1">
+                <emma:interpretation id="interp5" emma:lang="en-US" emma:confidence="1">
+                  <emma:literal>a</emma:literal>
+                </emma:interpretation>
+                <emma:interpretation id="interp6" emma:lang="en-US" emma:confidence="0">
+                  <emma:literal>n</emma:literal>
+                </emma:interpretation>
+                <emma:interpretation id="interp7" emma:lang="en-US" emma:confidence="0">
+                  <emma:literal>2</emma:literal>
+                </emma:interpretation>
+                <emma:interpretation id="interp8" emma:lang="en-US" emma:confidence="0">
+                  <emma:literal>u</emma:literal>
+                </emma:interpretation>
+                <emma:interpretation id="interp9" emma:lang="en-US" emma:confidence="0">
+                  <emma:literal>m</emma:literal>
+                </emma:interpretation>
+              </emma:one-of>
+            </emma:emma>
+          </inkml:annotationXML>
+          <inkml:trace contextRef="#ctx0" brushRef="#br0" timeOffset="1327.8898">6978 1108 1 0,'0'-21'0'0,"-13"-29"6"15,17 10 19-15,-8-8-18 16,2 1 0-16,6 2 1 16,-2 0-3-16,9 2 1 15,-5 5-2-15,10 12 0 16,1 0 0-16,11 5 0 15,4 6 0-15,13 6-1 0,9 9 1 16,11 7 0 0,4 8-1-16,8 6 1 0,1 11-1 15,-3 20-1-15,-6 4 1 16,-6 8-2 0,-14 0 0-16,-10-2 0 0,-15-4 0 15,-13-6-1-15,-22-3 1 16,-19-6-1-16,-22-13 1 15,-21-2-1-15,-16-11 1 16,-14-2 0-16,-9-5-1 16,-2 1 1-16,4-9-1 15,13 0 0-15,17-4 1 16,20 4-1-16,23 5 1 0,37-7 0 16,9 26 0-16,40-9 0 15,35-2 1 1,28-2 1-16,22-1 0 15,28 1 0-15,17-8 0 0,19 1 0 16,2-12 0-16,7-1-1 16,-11-1 0-16,-4 1-1 15,-13-4-1-15,-15 3 0 16,-20-1-1-16,-23-6 0 16,-22 7-1-16,-32-5-3 15,-14 2-2-15,-29-10-4 16,-24 21-7-16,-2-32-11 15,-28 2-6-15,2 2 0 0,-17-17 30 16</inkml:trace>
+        </inkml:traceGroup>
+      </inkml:traceGroup>
+    </inkml:traceGroup>
+  </inkml:traceGroup>
+</inkml:ink>
+</file>
+
+<file path=ppt/ink/ink9.xml><?xml version="1.0" encoding="utf-8"?>
+<inkml:ink xmlns:inkml="http://www.w3.org/2003/InkML">
+  <inkml:definitions>
+    <inkml:context xml:id="ctx0">
+      <inkml:inkSource xml:id="inkSrc0">
+        <inkml:traceFormat>
+          <inkml:channel name="X" type="integer" max="27760" units="cm"/>
+          <inkml:channel name="Y" type="integer" max="15694" units="cm"/>
+          <inkml:channel name="F" type="integer" max="255" units="dev"/>
+          <inkml:channel name="T" type="integer" max="2.14748E9" units="dev"/>
+        </inkml:traceFormat>
+        <inkml:channelProperties>
+          <inkml:channelProperty channel="X" name="resolution" value="1000" units="1/cm"/>
+          <inkml:channelProperty channel="Y" name="resolution" value="1000.25494" units="1/cm"/>
+          <inkml:channelProperty channel="F" name="resolution" value="0" units="1/dev"/>
+          <inkml:channelProperty channel="T" name="resolution" value="1" units="1/dev"/>
+        </inkml:channelProperties>
+      </inkml:inkSource>
+      <inkml:timestamp xml:id="ts0" timeString="2015-11-04T18:53:32.842"/>
+    </inkml:context>
+    <inkml:brush xml:id="br0">
+      <inkml:brushProperty name="width" value="0.06667" units="cm"/>
+      <inkml:brushProperty name="height" value="0.06667" units="cm"/>
+      <inkml:brushProperty name="color" value="#ED1C24"/>
+      <inkml:brushProperty name="fitToCurve" value="1"/>
+    </inkml:brush>
+  </inkml:definitions>
+  <inkml:traceGroup>
+    <inkml:annotationXML>
+      <emma:emma xmlns:emma="http://www.w3.org/2003/04/emma" version="1.0">
+        <emma:interpretation id="{2521BBD2-C495-47B9-8451-44238788D794}" emma:medium="tactile" emma:mode="ink">
+          <msink:context xmlns:msink="http://schemas.microsoft.com/ink/2010/main" type="writingRegion" rotatedBoundingBox="2862,9905 2581,15953 654,15864 934,9815"/>
+        </emma:interpretation>
+      </emma:emma>
+    </inkml:annotationXML>
+    <inkml:traceGroup>
+      <inkml:annotationXML>
+        <emma:emma xmlns:emma="http://www.w3.org/2003/04/emma" version="1.0">
+          <emma:interpretation id="{6618670B-5C14-41AD-8A46-A29A3CFA4DC3}" emma:medium="tactile" emma:mode="ink">
+            <msink:context xmlns:msink="http://schemas.microsoft.com/ink/2010/main" type="paragraph" rotatedBoundingBox="2862,9905 2581,15953 654,15864 934,9815" alignmentLevel="1"/>
+          </emma:interpretation>
+        </emma:emma>
+      </inkml:annotationXML>
+      <inkml:traceGroup>
+        <inkml:annotationXML>
+          <emma:emma xmlns:emma="http://www.w3.org/2003/04/emma" version="1.0">
+            <emma:interpretation id="{C5314A1F-DDD0-455B-9580-C6CD2CF335B1}" emma:medium="tactile" emma:mode="ink">
+              <msink:context xmlns:msink="http://schemas.microsoft.com/ink/2010/main" type="line" rotatedBoundingBox="2862,9905 2581,15953 654,15864 934,9815"/>
+            </emma:interpretation>
+          </emma:emma>
+        </inkml:annotationXML>
+        <inkml:traceGroup>
+          <inkml:annotationXML>
+            <emma:emma xmlns:emma="http://www.w3.org/2003/04/emma" version="1.0">
+              <emma:interpretation id="{248A32E7-DD8A-4DE0-9F5F-813E6B0ECEB7}" emma:medium="tactile" emma:mode="ink">
+                <msink:context xmlns:msink="http://schemas.microsoft.com/ink/2010/main" type="inkWord" rotatedBoundingBox="654,15864 934,9815 2862,9905 2581,15953"/>
+              </emma:interpretation>
+              <emma:one-of disjunction-type="recognition" id="oneOf0">
+                <emma:interpretation id="interp0" emma:lang="en-US" emma:confidence="0">
+                  <emma:literal>}</emma:literal>
+                </emma:interpretation>
+                <emma:interpretation id="interp1" emma:lang="en-US" emma:confidence="0">
+                  <emma:literal>]</emma:literal>
+                </emma:interpretation>
+                <emma:interpretation id="interp2" emma:lang="en-US" emma:confidence="0">
+                  <emma:literal>1</emma:literal>
+                </emma:interpretation>
+                <emma:interpretation id="interp3" emma:lang="en-US" emma:confidence="0">
+                  <emma:literal>{</emma:literal>
+                </emma:interpretation>
+                <emma:interpretation id="interp4" emma:lang="en-US" emma:confidence="0">
+                  <emma:literal>3</emma:literal>
+                </emma:interpretation>
+              </emma:one-of>
+            </emma:emma>
+          </inkml:annotationXML>
+          <inkml:trace contextRef="#ctx0" brushRef="#br0">54 33 1 0,'-26'-6'23'16,"-6"-14"5"-16,32 20 1 16,0 0-21-16,0-21-3 15,43 25 2-15,17 5-2 0,24 2-1 16,11 4 1 0,15 12 0-16,11 3-1 15,6 9 0-15,-13 8-1 16,-6 5-1-16,-15 5-1 0,-24 8 1 15,-22 1-1-15,-25 1 0 16,-35 5-1-16,-28 3 1 16,-28-8-1-16,-22-5 1 15,-12-4-1-15,-5-13 0 16,0-7 0-16,11-5-1 16,20-16 1-16,19-7-2 15,30-5 1-15,28-5 0 16,40 0 0-16,34 4 1 15,36 7-1-15,36-3 1 16,31 14 0-16,15 10 1 16,4 11 0-16,-13 17 0 15,-19 6 2-15,-35 18-1 0,-38-5 2 16,-55 20-1-16,-57-3 1 16,-46 3-1-16,-41-5 1 15,-26-10-1-15,-23-9-1 16,-11-9 0-16,-6-17-1 15,10-19-1-15,17-21 0 16,20-9 0-16,26-11-3 16,15-8-2-16,34 6-8 15,15-19-11-15,24 4-12 16,28 2 0-16,16-14 1 16</inkml:trace>
+          <inkml:trace contextRef="#ctx0" brushRef="#br0" timeOffset="1360.9145">-64 4332 1 0,'-43'-43'5'15,"43"43"18"-15,-33-51 2 16,14 23-18-16,6 4 0 16,0-4-1-16,4 7 1 15,-1-3 0-15,5 5 1 16,-5-2 0-16,10 21 0 15,4-35 0-15,-4 35-1 16,32-32-1-16,3 24-1 16,16-1-1-16,16 9-1 15,13-2 0-15,10 4-1 16,14 5-1-16,6 3 1 16,4 10-1-16,2 5 0 15,-12 7 0-15,-12 11-1 0,-18 9 1 16,-23 12-1-16,-25 17 0 15,-30 12 1-15,-33 12-1 16,-25 2 0-16,-27 4 0 16,-16-1 1-16,-7-8-1 15,0-9 1-15,6-21 0 16,20-16-2-16,26-22 2 16,34-12-2-16,26-22 2 15,60 6-1-15,22-19-1 16,37-2 1-16,25-2-1 15,15 4 2-15,7 1-1 16,-8 7 1-16,-25 5 0 0,-14 7 1 16,-37 16 1-16,-39 14 0 15,-41 16 1-15,-37 20-1 16,-36 13 1-16,-26 6 0 16,-19 9-3-16,-16-3 1 15,-5-6-1-15,5-12 0 16,3-16-1-16,8-19 1 15,16-17-3-15,14-13-1 16,22-13-2-16,4-19-7 16,37-13-27-16,20-11 1 15,14-23 0-15,33-11-1 16</inkml:trace>
+        </inkml:traceGroup>
+      </inkml:traceGroup>
+    </inkml:traceGroup>
+  </inkml:traceGroup>
+</inkml:ink>
 </file>
 
 <file path=ppt/notesMasters/notesMaster1.xml><?xml version="1.0" encoding="utf-8"?>
@@ -473,7 +1336,7 @@
           <a:p>
             <a:fld id="{97853E5F-CE67-483C-A264-F17AC70E9CA2}" type="datetimeFigureOut">
               <a:rPr lang="en-US"/>
-              <a:t>11/3/2015</a:t>
+              <a:t>11/4/2015</a:t>
             </a:fld>
             <a:endParaRPr dirty="0"/>
           </a:p>
@@ -1600,7 +2463,7 @@
           <a:p>
             <a:fld id="{3E0FA9E5-6744-4841-888F-9E7CC0C2B7EC}" type="datetimeFigureOut">
               <a:rPr lang="en-US" smtClean="0"/>
-              <a:t>11/3/2015</a:t>
+              <a:t>11/4/2015</a:t>
             </a:fld>
             <a:endParaRPr lang="en-US" dirty="0"/>
           </a:p>
@@ -1884,7 +2747,7 @@
           <a:p>
             <a:fld id="{3E0FA9E5-6744-4841-888F-9E7CC0C2B7EC}" type="datetimeFigureOut">
               <a:rPr lang="en-US" smtClean="0"/>
-              <a:t>11/3/2015</a:t>
+              <a:t>11/4/2015</a:t>
             </a:fld>
             <a:endParaRPr lang="en-US" dirty="0"/>
           </a:p>
@@ -2073,7 +2936,7 @@
           <a:p>
             <a:fld id="{3E0FA9E5-6744-4841-888F-9E7CC0C2B7EC}" type="datetimeFigureOut">
               <a:rPr lang="en-US" smtClean="0"/>
-              <a:t>11/3/2015</a:t>
+              <a:t>11/4/2015</a:t>
             </a:fld>
             <a:endParaRPr lang="en-US" dirty="0"/>
           </a:p>
@@ -2272,7 +3135,7 @@
           <a:p>
             <a:fld id="{3E0FA9E5-6744-4841-888F-9E7CC0C2B7EC}" type="datetimeFigureOut">
               <a:rPr lang="en-US" smtClean="0"/>
-              <a:t>11/3/2015</a:t>
+              <a:t>11/4/2015</a:t>
             </a:fld>
             <a:endParaRPr lang="en-US" dirty="0"/>
           </a:p>
@@ -2461,7 +3324,7 @@
           <a:p>
             <a:fld id="{3E0FA9E5-6744-4841-888F-9E7CC0C2B7EC}" type="datetimeFigureOut">
               <a:rPr lang="en-US" smtClean="0"/>
-              <a:t>11/3/2015</a:t>
+              <a:t>11/4/2015</a:t>
             </a:fld>
             <a:endParaRPr lang="en-US" dirty="0"/>
           </a:p>
@@ -2734,7 +3597,7 @@
           <a:p>
             <a:fld id="{3E0FA9E5-6744-4841-888F-9E7CC0C2B7EC}" type="datetimeFigureOut">
               <a:rPr lang="en-US" smtClean="0"/>
-              <a:t>11/3/2015</a:t>
+              <a:t>11/4/2015</a:t>
             </a:fld>
             <a:endParaRPr lang="en-US" dirty="0"/>
           </a:p>
@@ -3045,7 +3908,7 @@
           <a:p>
             <a:fld id="{3E0FA9E5-6744-4841-888F-9E7CC0C2B7EC}" type="datetimeFigureOut">
               <a:rPr lang="en-US" smtClean="0"/>
-              <a:t>11/3/2015</a:t>
+              <a:t>11/4/2015</a:t>
             </a:fld>
             <a:endParaRPr lang="en-US" dirty="0"/>
           </a:p>
@@ -3505,7 +4368,7 @@
           <a:p>
             <a:fld id="{3E0FA9E5-6744-4841-888F-9E7CC0C2B7EC}" type="datetimeFigureOut">
               <a:rPr lang="en-US" smtClean="0"/>
-              <a:t>11/3/2015</a:t>
+              <a:t>11/4/2015</a:t>
             </a:fld>
             <a:endParaRPr lang="en-US" dirty="0"/>
           </a:p>
@@ -3642,7 +4505,7 @@
           <a:p>
             <a:fld id="{3E0FA9E5-6744-4841-888F-9E7CC0C2B7EC}" type="datetimeFigureOut">
               <a:rPr lang="en-US" smtClean="0"/>
-              <a:t>11/3/2015</a:t>
+              <a:t>11/4/2015</a:t>
             </a:fld>
             <a:endParaRPr lang="en-US" dirty="0"/>
           </a:p>
@@ -3756,7 +4619,7 @@
           <a:p>
             <a:fld id="{3E0FA9E5-6744-4841-888F-9E7CC0C2B7EC}" type="datetimeFigureOut">
               <a:rPr lang="en-US" smtClean="0"/>
-              <a:t>11/3/2015</a:t>
+              <a:t>11/4/2015</a:t>
             </a:fld>
             <a:endParaRPr lang="en-US" dirty="0"/>
           </a:p>
@@ -4334,7 +5197,7 @@
             <a:fld id="{3E0FA9E5-6744-4841-888F-9E7CC0C2B7EC}" type="datetimeFigureOut">
               <a:rPr lang="en-US" smtClean="0"/>
               <a:pPr/>
-              <a:t>11/3/2015</a:t>
+              <a:t>11/4/2015</a:t>
             </a:fld>
             <a:endParaRPr lang="en-US" dirty="0"/>
           </a:p>
@@ -4924,7 +5787,6 @@
               <a:rPr lang="en-US" dirty="0" smtClean="0"/>
               <a:t>Discussion Leader: Linfeng Li &amp; Chen Wang</a:t>
             </a:r>
-            <a:endParaRPr lang="en-US" dirty="0" smtClean="0"/>
           </a:p>
           <a:p>
             <a:endParaRPr lang="en-US" dirty="0"/>
@@ -5232,11 +6094,7 @@
           <a:p>
             <a:r>
               <a:rPr lang="en-US" sz="4400" dirty="0" smtClean="0"/>
-              <a:t>Some </a:t>
-            </a:r>
-            <a:r>
-              <a:rPr lang="en-US" sz="4400" dirty="0" smtClean="0"/>
-              <a:t>Simple Games</a:t>
+              <a:t>Some Simple Games</a:t>
             </a:r>
             <a:endParaRPr lang="en-US" sz="4400" dirty="0"/>
           </a:p>
@@ -5600,18 +6458,7 @@
                           <a:ea typeface="+mn-ea"/>
                           <a:cs typeface="+mn-cs"/>
                         </a:rPr>
-                        <a:t>Payoff </a:t>
-                      </a:r>
-                      <a:r>
-                        <a:rPr lang="en-US" sz="1800" kern="1200" dirty="0" smtClean="0">
-                          <a:solidFill>
-                            <a:schemeClr val="dk1"/>
-                          </a:solidFill>
-                          <a:latin typeface="+mn-lt"/>
-                          <a:ea typeface="+mn-ea"/>
-                          <a:cs typeface="+mn-cs"/>
-                        </a:rPr>
-                        <a:t>for Column Player </a:t>
+                        <a:t>Payoff for Column Player </a:t>
                       </a:r>
                     </a:p>
                   </a:txBody>
@@ -5787,13 +6634,13 @@
   <p:clrMapOvr>
     <a:masterClrMapping/>
   </p:clrMapOvr>
-  <mc:AlternateContent xmlns:mc="http://schemas.openxmlformats.org/markup-compatibility/2006">
-    <mc:Choice xmlns:p14="http://schemas.microsoft.com/office/powerpoint/2010/main" Requires="p14">
+  <mc:AlternateContent xmlns:mc="http://schemas.openxmlformats.org/markup-compatibility/2006" xmlns:p14="http://schemas.microsoft.com/office/powerpoint/2010/main">
+    <mc:Choice Requires="p14">
       <p:transition spd="med" p14:dur="700">
         <p:fade/>
       </p:transition>
     </mc:Choice>
-    <mc:Fallback>
+    <mc:Fallback xmlns="">
       <p:transition spd="med">
         <p:fade/>
       </p:transition>
@@ -6073,6 +6920,123 @@
           </a:p>
         </p:txBody>
       </p:sp>
+      <mc:AlternateContent xmlns:mc="http://schemas.openxmlformats.org/markup-compatibility/2006">
+        <mc:Choice xmlns:p14="http://schemas.microsoft.com/office/powerpoint/2010/main" Requires="p14">
+          <p:contentPart p14:bwMode="auto" r:id="rId3">
+            <p14:nvContentPartPr>
+              <p14:cNvPr id="7" name="Ink 6"/>
+              <p14:cNvContentPartPr/>
+              <p14:nvPr/>
+            </p14:nvContentPartPr>
+            <p14:xfrm>
+              <a:off x="239561" y="3565974"/>
+              <a:ext cx="606960" cy="2307960"/>
+            </p14:xfrm>
+          </p:contentPart>
+        </mc:Choice>
+        <mc:Fallback>
+          <p:pic>
+            <p:nvPicPr>
+              <p:cNvPr id="7" name="Ink 6"/>
+              <p:cNvPicPr/>
+              <p:nvPr/>
+            </p:nvPicPr>
+            <p:blipFill>
+              <a:blip r:embed="rId4"/>
+              <a:stretch>
+                <a:fillRect/>
+              </a:stretch>
+            </p:blipFill>
+            <p:spPr>
+              <a:xfrm>
+                <a:off x="235961" y="3560574"/>
+                <a:ext cx="623160" cy="2327400"/>
+              </a:xfrm>
+              <a:prstGeom prst="rect">
+                <a:avLst/>
+              </a:prstGeom>
+            </p:spPr>
+          </p:pic>
+        </mc:Fallback>
+      </mc:AlternateContent>
+      <mc:AlternateContent xmlns:mc="http://schemas.openxmlformats.org/markup-compatibility/2006">
+        <mc:Choice xmlns:p14="http://schemas.microsoft.com/office/powerpoint/2010/main" Requires="p14">
+          <p:contentPart p14:bwMode="auto" r:id="rId5">
+            <p14:nvContentPartPr>
+              <p14:cNvPr id="11" name="Ink 10"/>
+              <p14:cNvContentPartPr/>
+              <p14:nvPr/>
+            </p14:nvContentPartPr>
+            <p14:xfrm>
+              <a:off x="5160401" y="1130574"/>
+              <a:ext cx="879840" cy="477360"/>
+            </p14:xfrm>
+          </p:contentPart>
+        </mc:Choice>
+        <mc:Fallback>
+          <p:pic>
+            <p:nvPicPr>
+              <p:cNvPr id="11" name="Ink 10"/>
+              <p:cNvPicPr/>
+              <p:nvPr/>
+            </p:nvPicPr>
+            <p:blipFill>
+              <a:blip r:embed="rId6"/>
+              <a:stretch>
+                <a:fillRect/>
+              </a:stretch>
+            </p:blipFill>
+            <p:spPr>
+              <a:xfrm>
+                <a:off x="5157161" y="1123374"/>
+                <a:ext cx="886320" cy="496080"/>
+              </a:xfrm>
+              <a:prstGeom prst="rect">
+                <a:avLst/>
+              </a:prstGeom>
+            </p:spPr>
+          </p:pic>
+        </mc:Fallback>
+      </mc:AlternateContent>
+      <mc:AlternateContent xmlns:mc="http://schemas.openxmlformats.org/markup-compatibility/2006">
+        <mc:Choice xmlns:p14="http://schemas.microsoft.com/office/powerpoint/2010/main" Requires="p14">
+          <p:contentPart p14:bwMode="auto" r:id="rId7">
+            <p14:nvContentPartPr>
+              <p14:cNvPr id="13" name="Ink 12"/>
+              <p14:cNvContentPartPr/>
+              <p14:nvPr/>
+            </p14:nvContentPartPr>
+            <p14:xfrm>
+              <a:off x="8020961" y="952374"/>
+              <a:ext cx="735120" cy="829080"/>
+            </p14:xfrm>
+          </p:contentPart>
+        </mc:Choice>
+        <mc:Fallback>
+          <p:pic>
+            <p:nvPicPr>
+              <p:cNvPr id="13" name="Ink 12"/>
+              <p:cNvPicPr/>
+              <p:nvPr/>
+            </p:nvPicPr>
+            <p:blipFill>
+              <a:blip r:embed="rId8"/>
+              <a:stretch>
+                <a:fillRect/>
+              </a:stretch>
+            </p:blipFill>
+            <p:spPr>
+              <a:xfrm>
+                <a:off x="8011601" y="945534"/>
+                <a:ext cx="748800" cy="848160"/>
+              </a:xfrm>
+              <a:prstGeom prst="rect">
+                <a:avLst/>
+              </a:prstGeom>
+            </p:spPr>
+          </p:pic>
+        </mc:Fallback>
+      </mc:AlternateContent>
     </p:spTree>
     <p:extLst>
       <p:ext uri="{BB962C8B-B14F-4D97-AF65-F5344CB8AC3E}">
@@ -6083,13 +7047,13 @@
   <p:clrMapOvr>
     <a:masterClrMapping/>
   </p:clrMapOvr>
-  <mc:AlternateContent xmlns:mc="http://schemas.openxmlformats.org/markup-compatibility/2006">
-    <mc:Choice xmlns:p14="http://schemas.microsoft.com/office/powerpoint/2010/main" Requires="p14">
+  <mc:AlternateContent xmlns:mc="http://schemas.openxmlformats.org/markup-compatibility/2006" xmlns:p14="http://schemas.microsoft.com/office/powerpoint/2010/main">
+    <mc:Choice Requires="p14">
       <p:transition spd="med" p14:dur="700">
         <p:fade/>
       </p:transition>
     </mc:Choice>
-    <mc:Fallback>
+    <mc:Fallback xmlns="">
       <p:transition spd="med">
         <p:fade/>
       </p:transition>
@@ -6134,8 +7098,8 @@
         </p:nvSpPr>
         <p:spPr>
           <a:xfrm>
-            <a:off x="1782664" y="27355"/>
-            <a:ext cx="8686801" cy="2078891"/>
+            <a:off x="1782664" y="-319588"/>
+            <a:ext cx="8686801" cy="1889901"/>
           </a:xfrm>
         </p:spPr>
         <p:txBody>
@@ -6151,7 +7115,15 @@
             </a:pPr>
             <a:r>
               <a:rPr lang="en-US" dirty="0"/>
-              <a:t>Battle of the Sexes </a:t>
+              <a:t>Battle </a:t>
+            </a:r>
+            <a:r>
+              <a:rPr lang="en-US" dirty="0" smtClean="0"/>
+              <a:t>of </a:t>
+            </a:r>
+            <a:r>
+              <a:rPr lang="en-US" dirty="0"/>
+              <a:t>the Sexes </a:t>
             </a:r>
             <a:br>
               <a:rPr lang="en-US" dirty="0"/>
@@ -6386,6 +7358,123 @@
           </a:graphicData>
         </a:graphic>
       </p:graphicFrame>
+      <mc:AlternateContent xmlns:mc="http://schemas.openxmlformats.org/markup-compatibility/2006">
+        <mc:Choice xmlns:p14="http://schemas.microsoft.com/office/powerpoint/2010/main" Requires="p14">
+          <p:contentPart p14:bwMode="auto" r:id="rId3">
+            <p14:nvContentPartPr>
+              <p14:cNvPr id="5" name="Ink 4"/>
+              <p14:cNvContentPartPr/>
+              <p14:nvPr/>
+            </p14:nvContentPartPr>
+            <p14:xfrm>
+              <a:off x="194561" y="3447174"/>
+              <a:ext cx="872640" cy="2261520"/>
+            </p14:xfrm>
+          </p:contentPart>
+        </mc:Choice>
+        <mc:Fallback>
+          <p:pic>
+            <p:nvPicPr>
+              <p:cNvPr id="5" name="Ink 4"/>
+              <p:cNvPicPr/>
+              <p:nvPr/>
+            </p:nvPicPr>
+            <p:blipFill>
+              <a:blip r:embed="rId4"/>
+              <a:stretch>
+                <a:fillRect/>
+              </a:stretch>
+            </p:blipFill>
+            <p:spPr>
+              <a:xfrm>
+                <a:off x="191321" y="3436014"/>
+                <a:ext cx="891360" cy="2281680"/>
+              </a:xfrm>
+              <a:prstGeom prst="rect">
+                <a:avLst/>
+              </a:prstGeom>
+            </p:spPr>
+          </p:pic>
+        </mc:Fallback>
+      </mc:AlternateContent>
+      <mc:AlternateContent xmlns:mc="http://schemas.openxmlformats.org/markup-compatibility/2006">
+        <mc:Choice xmlns:p14="http://schemas.microsoft.com/office/powerpoint/2010/main" Requires="p14">
+          <p:contentPart p14:bwMode="auto" r:id="rId5">
+            <p14:nvContentPartPr>
+              <p14:cNvPr id="11" name="Ink 10"/>
+              <p14:cNvContentPartPr/>
+              <p14:nvPr/>
+            </p14:nvContentPartPr>
+            <p14:xfrm>
+              <a:off x="5171561" y="1183742"/>
+              <a:ext cx="679680" cy="671400"/>
+            </p14:xfrm>
+          </p:contentPart>
+        </mc:Choice>
+        <mc:Fallback>
+          <p:pic>
+            <p:nvPicPr>
+              <p:cNvPr id="11" name="Ink 10"/>
+              <p:cNvPicPr/>
+              <p:nvPr/>
+            </p:nvPicPr>
+            <p:blipFill>
+              <a:blip r:embed="rId6"/>
+              <a:stretch>
+                <a:fillRect/>
+              </a:stretch>
+            </p:blipFill>
+            <p:spPr>
+              <a:xfrm>
+                <a:off x="5161121" y="1174022"/>
+                <a:ext cx="700560" cy="694440"/>
+              </a:xfrm>
+              <a:prstGeom prst="rect">
+                <a:avLst/>
+              </a:prstGeom>
+            </p:spPr>
+          </p:pic>
+        </mc:Fallback>
+      </mc:AlternateContent>
+      <mc:AlternateContent xmlns:mc="http://schemas.openxmlformats.org/markup-compatibility/2006">
+        <mc:Choice xmlns:p14="http://schemas.microsoft.com/office/powerpoint/2010/main" Requires="p14">
+          <p:contentPart p14:bwMode="auto" r:id="rId7">
+            <p14:nvContentPartPr>
+              <p14:cNvPr id="12" name="Ink 11"/>
+              <p14:cNvContentPartPr/>
+              <p14:nvPr/>
+            </p14:nvContentPartPr>
+            <p14:xfrm>
+              <a:off x="7861481" y="1186982"/>
+              <a:ext cx="536400" cy="633960"/>
+            </p14:xfrm>
+          </p:contentPart>
+        </mc:Choice>
+        <mc:Fallback>
+          <p:pic>
+            <p:nvPicPr>
+              <p:cNvPr id="12" name="Ink 11"/>
+              <p:cNvPicPr/>
+              <p:nvPr/>
+            </p:nvPicPr>
+            <p:blipFill>
+              <a:blip r:embed="rId8"/>
+              <a:stretch>
+                <a:fillRect/>
+              </a:stretch>
+            </p:blipFill>
+            <p:spPr>
+              <a:xfrm>
+                <a:off x="7858241" y="1176182"/>
+                <a:ext cx="552240" cy="659160"/>
+              </a:xfrm>
+              <a:prstGeom prst="rect">
+                <a:avLst/>
+              </a:prstGeom>
+            </p:spPr>
+          </p:pic>
+        </mc:Fallback>
+      </mc:AlternateContent>
     </p:spTree>
     <p:extLst>
       <p:ext uri="{BB962C8B-B14F-4D97-AF65-F5344CB8AC3E}">
@@ -6396,13 +7485,13 @@
   <p:clrMapOvr>
     <a:masterClrMapping/>
   </p:clrMapOvr>
-  <mc:AlternateContent xmlns:mc="http://schemas.openxmlformats.org/markup-compatibility/2006">
-    <mc:Choice xmlns:p14="http://schemas.microsoft.com/office/powerpoint/2010/main" Requires="p14">
+  <mc:AlternateContent xmlns:mc="http://schemas.openxmlformats.org/markup-compatibility/2006" xmlns:p14="http://schemas.microsoft.com/office/powerpoint/2010/main">
+    <mc:Choice Requires="p14">
       <p:transition spd="med" p14:dur="700">
         <p:fade/>
       </p:transition>
     </mc:Choice>
-    <mc:Fallback>
+    <mc:Fallback xmlns="">
       <p:transition spd="med">
         <p:fade/>
       </p:transition>
@@ -6447,7 +7536,7 @@
         </p:nvSpPr>
         <p:spPr>
           <a:xfrm>
-            <a:off x="1782664" y="-57053"/>
+            <a:off x="1782664" y="-325072"/>
             <a:ext cx="8686801" cy="2078891"/>
           </a:xfrm>
         </p:spPr>
@@ -6707,6 +7796,84 @@
           </a:graphicData>
         </a:graphic>
       </p:graphicFrame>
+      <mc:AlternateContent xmlns:mc="http://schemas.openxmlformats.org/markup-compatibility/2006">
+        <mc:Choice xmlns:p14="http://schemas.microsoft.com/office/powerpoint/2010/main" Requires="p14">
+          <p:contentPart p14:bwMode="auto" r:id="rId3">
+            <p14:nvContentPartPr>
+              <p14:cNvPr id="4" name="Ink 3"/>
+              <p14:cNvContentPartPr/>
+              <p14:nvPr/>
+            </p14:nvContentPartPr>
+            <p14:xfrm>
+              <a:off x="231641" y="3499374"/>
+              <a:ext cx="759960" cy="2055240"/>
+            </p14:xfrm>
+          </p:contentPart>
+        </mc:Choice>
+        <mc:Fallback>
+          <p:pic>
+            <p:nvPicPr>
+              <p:cNvPr id="4" name="Ink 3"/>
+              <p:cNvPicPr/>
+              <p:nvPr/>
+            </p:nvPicPr>
+            <p:blipFill>
+              <a:blip r:embed="rId4"/>
+              <a:stretch>
+                <a:fillRect/>
+              </a:stretch>
+            </p:blipFill>
+            <p:spPr>
+              <a:xfrm>
+                <a:off x="227681" y="3491094"/>
+                <a:ext cx="777240" cy="2078280"/>
+              </a:xfrm>
+              <a:prstGeom prst="rect">
+                <a:avLst/>
+              </a:prstGeom>
+            </p:spPr>
+          </p:pic>
+        </mc:Fallback>
+      </mc:AlternateContent>
+      <mc:AlternateContent xmlns:mc="http://schemas.openxmlformats.org/markup-compatibility/2006">
+        <mc:Choice xmlns:p14="http://schemas.microsoft.com/office/powerpoint/2010/main" Requires="p14">
+          <p:contentPart p14:bwMode="auto" r:id="rId5">
+            <p14:nvContentPartPr>
+              <p14:cNvPr id="13" name="Ink 12"/>
+              <p14:cNvContentPartPr/>
+              <p14:nvPr/>
+            </p14:nvContentPartPr>
+            <p14:xfrm>
+              <a:off x="5403041" y="1069312"/>
+              <a:ext cx="3384720" cy="676080"/>
+            </p14:xfrm>
+          </p:contentPart>
+        </mc:Choice>
+        <mc:Fallback>
+          <p:pic>
+            <p:nvPicPr>
+              <p:cNvPr id="13" name="Ink 12"/>
+              <p:cNvPicPr/>
+              <p:nvPr/>
+            </p:nvPicPr>
+            <p:blipFill>
+              <a:blip r:embed="rId6"/>
+              <a:stretch>
+                <a:fillRect/>
+              </a:stretch>
+            </p:blipFill>
+            <p:spPr>
+              <a:xfrm>
+                <a:off x="5393321" y="1061752"/>
+                <a:ext cx="3405960" cy="693360"/>
+              </a:xfrm>
+              <a:prstGeom prst="rect">
+                <a:avLst/>
+              </a:prstGeom>
+            </p:spPr>
+          </p:pic>
+        </mc:Fallback>
+      </mc:AlternateContent>
     </p:spTree>
     <p:extLst>
       <p:ext uri="{BB962C8B-B14F-4D97-AF65-F5344CB8AC3E}">
@@ -6717,13 +7884,13 @@
   <p:clrMapOvr>
     <a:masterClrMapping/>
   </p:clrMapOvr>
-  <mc:AlternateContent xmlns:mc="http://schemas.openxmlformats.org/markup-compatibility/2006">
-    <mc:Choice xmlns:p14="http://schemas.microsoft.com/office/powerpoint/2010/main" Requires="p14">
+  <mc:AlternateContent xmlns:mc="http://schemas.openxmlformats.org/markup-compatibility/2006" xmlns:p14="http://schemas.microsoft.com/office/powerpoint/2010/main">
+    <mc:Choice Requires="p14">
       <p:transition spd="med" p14:dur="700">
         <p:fade/>
       </p:transition>
     </mc:Choice>
-    <mc:Fallback>
+    <mc:Fallback xmlns="">
       <p:transition spd="med">
         <p:fade/>
       </p:transition>
@@ -6975,7 +8142,7 @@
         </p:nvSpPr>
         <p:spPr>
           <a:xfrm>
-            <a:off x="1782664" y="-563496"/>
+            <a:off x="1782664" y="-910344"/>
             <a:ext cx="8686801" cy="2078891"/>
           </a:xfrm>
         </p:spPr>
@@ -7016,6 +8183,123 @@
           </a:p>
         </p:txBody>
       </p:sp>
+      <mc:AlternateContent xmlns:mc="http://schemas.openxmlformats.org/markup-compatibility/2006">
+        <mc:Choice xmlns:p14="http://schemas.microsoft.com/office/powerpoint/2010/main" Requires="p14">
+          <p:contentPart p14:bwMode="auto" r:id="rId3">
+            <p14:nvContentPartPr>
+              <p14:cNvPr id="3" name="Ink 2"/>
+              <p14:cNvContentPartPr/>
+              <p14:nvPr/>
+            </p14:nvContentPartPr>
+            <p14:xfrm>
+              <a:off x="268721" y="3539197"/>
+              <a:ext cx="737280" cy="2181600"/>
+            </p14:xfrm>
+          </p:contentPart>
+        </mc:Choice>
+        <mc:Fallback>
+          <p:pic>
+            <p:nvPicPr>
+              <p:cNvPr id="3" name="Ink 2"/>
+              <p:cNvPicPr/>
+              <p:nvPr/>
+            </p:nvPicPr>
+            <p:blipFill>
+              <a:blip r:embed="rId4"/>
+              <a:stretch>
+                <a:fillRect/>
+              </a:stretch>
+            </p:blipFill>
+            <p:spPr>
+              <a:xfrm>
+                <a:off x="257921" y="3529477"/>
+                <a:ext cx="761400" cy="2207160"/>
+              </a:xfrm>
+              <a:prstGeom prst="rect">
+                <a:avLst/>
+              </a:prstGeom>
+            </p:spPr>
+          </p:pic>
+        </mc:Fallback>
+      </mc:AlternateContent>
+      <mc:AlternateContent xmlns:mc="http://schemas.openxmlformats.org/markup-compatibility/2006">
+        <mc:Choice xmlns:p14="http://schemas.microsoft.com/office/powerpoint/2010/main" Requires="p14">
+          <p:contentPart p14:bwMode="auto" r:id="rId5">
+            <p14:nvContentPartPr>
+              <p14:cNvPr id="6" name="Ink 5"/>
+              <p14:cNvContentPartPr/>
+              <p14:nvPr/>
+            </p14:nvContentPartPr>
+            <p14:xfrm>
+              <a:off x="5286401" y="1180477"/>
+              <a:ext cx="672480" cy="683280"/>
+            </p14:xfrm>
+          </p:contentPart>
+        </mc:Choice>
+        <mc:Fallback>
+          <p:pic>
+            <p:nvPicPr>
+              <p:cNvPr id="6" name="Ink 5"/>
+              <p:cNvPicPr/>
+              <p:nvPr/>
+            </p:nvPicPr>
+            <p:blipFill>
+              <a:blip r:embed="rId6"/>
+              <a:stretch>
+                <a:fillRect/>
+              </a:stretch>
+            </p:blipFill>
+            <p:spPr>
+              <a:xfrm>
+                <a:off x="5273801" y="1169677"/>
+                <a:ext cx="695160" cy="705240"/>
+              </a:xfrm>
+              <a:prstGeom prst="rect">
+                <a:avLst/>
+              </a:prstGeom>
+            </p:spPr>
+          </p:pic>
+        </mc:Fallback>
+      </mc:AlternateContent>
+      <mc:AlternateContent xmlns:mc="http://schemas.openxmlformats.org/markup-compatibility/2006">
+        <mc:Choice xmlns:p14="http://schemas.microsoft.com/office/powerpoint/2010/main" Requires="p14">
+          <p:contentPart p14:bwMode="auto" r:id="rId7">
+            <p14:nvContentPartPr>
+              <p14:cNvPr id="10" name="Ink 9"/>
+              <p14:cNvContentPartPr/>
+              <p14:nvPr/>
+            </p14:nvContentPartPr>
+            <p14:xfrm>
+              <a:off x="7915121" y="1259677"/>
+              <a:ext cx="921240" cy="392760"/>
+            </p14:xfrm>
+          </p:contentPart>
+        </mc:Choice>
+        <mc:Fallback>
+          <p:pic>
+            <p:nvPicPr>
+              <p:cNvPr id="10" name="Ink 9"/>
+              <p:cNvPicPr/>
+              <p:nvPr/>
+            </p:nvPicPr>
+            <p:blipFill>
+              <a:blip r:embed="rId8"/>
+              <a:stretch>
+                <a:fillRect/>
+              </a:stretch>
+            </p:blipFill>
+            <p:spPr>
+              <a:xfrm>
+                <a:off x="7901441" y="1246717"/>
+                <a:ext cx="938160" cy="420120"/>
+              </a:xfrm>
+              <a:prstGeom prst="rect">
+                <a:avLst/>
+              </a:prstGeom>
+            </p:spPr>
+          </p:pic>
+        </mc:Fallback>
+      </mc:AlternateContent>
     </p:spTree>
     <p:extLst>
       <p:ext uri="{BB962C8B-B14F-4D97-AF65-F5344CB8AC3E}">
@@ -7026,13 +8310,13 @@
   <p:clrMapOvr>
     <a:masterClrMapping/>
   </p:clrMapOvr>
-  <mc:AlternateContent xmlns:mc="http://schemas.openxmlformats.org/markup-compatibility/2006">
-    <mc:Choice xmlns:p14="http://schemas.microsoft.com/office/powerpoint/2010/main" Requires="p14">
+  <mc:AlternateContent xmlns:mc="http://schemas.openxmlformats.org/markup-compatibility/2006" xmlns:p14="http://schemas.microsoft.com/office/powerpoint/2010/main">
+    <mc:Choice Requires="p14">
       <p:transition spd="med" p14:dur="700">
         <p:fade/>
       </p:transition>
     </mc:Choice>
-    <mc:Fallback>
+    <mc:Fallback xmlns="">
       <p:transition spd="med">
         <p:fade/>
       </p:transition>
@@ -7127,13 +8411,13 @@
   <p:clrMapOvr>
     <a:masterClrMapping/>
   </p:clrMapOvr>
-  <mc:AlternateContent xmlns:mc="http://schemas.openxmlformats.org/markup-compatibility/2006">
-    <mc:Choice xmlns:p14="http://schemas.microsoft.com/office/powerpoint/2010/main" Requires="p14">
+  <mc:AlternateContent xmlns:mc="http://schemas.openxmlformats.org/markup-compatibility/2006" xmlns:p14="http://schemas.microsoft.com/office/powerpoint/2010/main">
+    <mc:Choice Requires="p14">
       <p:transition spd="med" p14:dur="700">
         <p:fade/>
       </p:transition>
     </mc:Choice>
-    <mc:Fallback>
+    <mc:Fallback xmlns="">
       <p:transition spd="med">
         <p:fade/>
       </p:transition>
@@ -7239,11 +8523,7 @@
             </a:br>
             <a:r>
               <a:rPr lang="en-US" sz="3600" dirty="0" smtClean="0"/>
-              <a:t>One solution concept: Iterated </a:t>
-            </a:r>
-            <a:r>
-              <a:rPr lang="en-US" sz="3600" dirty="0" smtClean="0"/>
-              <a:t>Deletion</a:t>
+              <a:t>One solution concept: Iterated Deletion</a:t>
             </a:r>
           </a:p>
         </p:txBody>
@@ -7632,13 +8912,13 @@
   <p:clrMapOvr>
     <a:masterClrMapping/>
   </p:clrMapOvr>
-  <mc:AlternateContent xmlns:mc="http://schemas.openxmlformats.org/markup-compatibility/2006">
-    <mc:Choice xmlns:p14="http://schemas.microsoft.com/office/powerpoint/2010/main" Requires="p14">
+  <mc:AlternateContent xmlns:mc="http://schemas.openxmlformats.org/markup-compatibility/2006" xmlns:p14="http://schemas.microsoft.com/office/powerpoint/2010/main">
+    <mc:Choice Requires="p14">
       <p:transition spd="med" p14:dur="700">
         <p:fade/>
       </p:transition>
     </mc:Choice>
-    <mc:Fallback>
+    <mc:Fallback xmlns="">
       <p:transition spd="med">
         <p:fade/>
       </p:transition>
@@ -8486,13 +9766,13 @@
   <p:clrMapOvr>
     <a:masterClrMapping/>
   </p:clrMapOvr>
-  <mc:AlternateContent xmlns:mc="http://schemas.openxmlformats.org/markup-compatibility/2006">
-    <mc:Choice xmlns:p14="http://schemas.microsoft.com/office/powerpoint/2010/main" Requires="p14">
+  <mc:AlternateContent xmlns:mc="http://schemas.openxmlformats.org/markup-compatibility/2006" xmlns:p14="http://schemas.microsoft.com/office/powerpoint/2010/main">
+    <mc:Choice Requires="p14">
       <p:transition spd="med" p14:dur="700">
         <p:fade/>
       </p:transition>
     </mc:Choice>
-    <mc:Fallback>
+    <mc:Fallback xmlns="">
       <p:transition spd="med">
         <p:fade/>
       </p:transition>
@@ -8851,13 +10131,13 @@
   <p:clrMapOvr>
     <a:masterClrMapping/>
   </p:clrMapOvr>
-  <mc:AlternateContent xmlns:mc="http://schemas.openxmlformats.org/markup-compatibility/2006">
-    <mc:Choice xmlns:p14="http://schemas.microsoft.com/office/powerpoint/2010/main" Requires="p14">
+  <mc:AlternateContent xmlns:mc="http://schemas.openxmlformats.org/markup-compatibility/2006" xmlns:p14="http://schemas.microsoft.com/office/powerpoint/2010/main">
+    <mc:Choice Requires="p14">
       <p:transition spd="med" p14:dur="700">
         <p:fade/>
       </p:transition>
     </mc:Choice>
-    <mc:Fallback>
+    <mc:Fallback xmlns="">
       <p:transition spd="med">
         <p:fade/>
       </p:transition>
@@ -9028,11 +10308,7 @@
           <a:p>
             <a:r>
               <a:rPr lang="en-US" sz="3600" dirty="0" smtClean="0"/>
-              <a:t>Another solution concept: Nash </a:t>
-            </a:r>
-            <a:r>
-              <a:rPr lang="en-US" sz="3600" dirty="0" smtClean="0"/>
-              <a:t>Equilibrium</a:t>
+              <a:t>Another solution concept: Nash Equilibrium</a:t>
             </a:r>
           </a:p>
         </p:txBody>
@@ -9321,13 +10597,13 @@
   <p:clrMapOvr>
     <a:masterClrMapping/>
   </p:clrMapOvr>
-  <mc:AlternateContent xmlns:mc="http://schemas.openxmlformats.org/markup-compatibility/2006">
-    <mc:Choice xmlns:p14="http://schemas.microsoft.com/office/powerpoint/2010/main" Requires="p14">
+  <mc:AlternateContent xmlns:mc="http://schemas.openxmlformats.org/markup-compatibility/2006" xmlns:p14="http://schemas.microsoft.com/office/powerpoint/2010/main">
+    <mc:Choice Requires="p14">
       <p:transition spd="med" p14:dur="700">
         <p:fade/>
       </p:transition>
     </mc:Choice>
-    <mc:Fallback>
+    <mc:Fallback xmlns="">
       <p:transition spd="med">
         <p:fade/>
       </p:transition>
@@ -9552,13 +10828,13 @@
   <p:clrMapOvr>
     <a:masterClrMapping/>
   </p:clrMapOvr>
-  <mc:AlternateContent xmlns:mc="http://schemas.openxmlformats.org/markup-compatibility/2006">
-    <mc:Choice xmlns:p14="http://schemas.microsoft.com/office/powerpoint/2010/main" Requires="p14">
+  <mc:AlternateContent xmlns:mc="http://schemas.openxmlformats.org/markup-compatibility/2006" xmlns:p14="http://schemas.microsoft.com/office/powerpoint/2010/main">
+    <mc:Choice Requires="p14">
       <p:transition spd="med" p14:dur="700">
         <p:fade/>
       </p:transition>
     </mc:Choice>
-    <mc:Fallback>
+    <mc:Fallback xmlns="">
       <p:transition spd="med">
         <p:fade/>
       </p:transition>
@@ -9784,30 +11060,23 @@
               <a:rPr lang="en-US" dirty="0" smtClean="0"/>
               <a:t>Being able to represent strategic situations as games</a:t>
             </a:r>
-            <a:endParaRPr lang="en-US" dirty="0" smtClean="0"/>
           </a:p>
           <a:p>
             <a:r>
               <a:rPr lang="en-US" dirty="0" smtClean="0"/>
               <a:t>Identify strategies</a:t>
             </a:r>
-            <a:endParaRPr lang="en-US" dirty="0" smtClean="0"/>
           </a:p>
           <a:p>
             <a:r>
               <a:rPr lang="en-US" dirty="0" smtClean="0"/>
               <a:t>Strategy profiles and payoffs</a:t>
             </a:r>
-            <a:endParaRPr lang="en-US" dirty="0" smtClean="0"/>
           </a:p>
           <a:p>
             <a:r>
               <a:rPr lang="en-US" dirty="0" smtClean="0"/>
-              <a:t>Identify common classes of games (Cooperation, Coordination, Zero-sum</a:t>
-            </a:r>
-            <a:r>
-              <a:rPr lang="en-US" dirty="0" smtClean="0"/>
-              <a:t>)</a:t>
+              <a:t>Identify common classes of games (Cooperation, Coordination, Zero-sum)</a:t>
             </a:r>
           </a:p>
           <a:p>
@@ -9815,21 +11084,18 @@
               <a:rPr lang="en-US" dirty="0" smtClean="0"/>
               <a:t>Solve games using iterated deletion of strictly dominated strategies</a:t>
             </a:r>
-            <a:endParaRPr lang="en-US" dirty="0" smtClean="0"/>
           </a:p>
           <a:p>
             <a:r>
               <a:rPr lang="en-US" dirty="0" smtClean="0"/>
               <a:t>Solve games using Nash Equilibrium</a:t>
             </a:r>
-            <a:endParaRPr lang="en-US" dirty="0" smtClean="0"/>
           </a:p>
           <a:p>
             <a:r>
               <a:rPr lang="en-US" dirty="0" smtClean="0"/>
               <a:t>Become aware of Nash existence theorem </a:t>
             </a:r>
-            <a:endParaRPr lang="en-US" dirty="0" smtClean="0"/>
           </a:p>
           <a:p>
             <a:endParaRPr lang="en-US" dirty="0" smtClean="0"/>
@@ -9969,7 +11235,6 @@
               <a:rPr lang="en-US" sz="2400" b="1" dirty="0" smtClean="0"/>
               <a:t>Linfeng &amp; Chen</a:t>
             </a:r>
-            <a:endParaRPr lang="en-US" sz="2400" b="1" dirty="0" smtClean="0"/>
           </a:p>
         </p:txBody>
       </p:sp>
@@ -10002,7 +11267,6 @@
               <a:rPr lang="en-US" dirty="0" smtClean="0"/>
               <a:t>10 min</a:t>
             </a:r>
-            <a:endParaRPr lang="en-US" dirty="0" smtClean="0"/>
           </a:p>
         </p:txBody>
       </p:sp>
@@ -10751,7 +12015,6 @@
               <a:rPr lang="en-US" dirty="0" smtClean="0"/>
               <a:t>Division of the Humanities and Social Sciences</a:t>
             </a:r>
-            <a:endParaRPr lang="en-US" dirty="0" smtClean="0"/>
           </a:p>
           <a:p>
             <a:pPr algn="ctr"/>
@@ -10956,12 +12219,6 @@
               </a:rPr>
               <a:t> in 2005, for </a:t>
             </a:r>
-            <a:endParaRPr lang="en-US" sz="1600" dirty="0" smtClean="0">
-              <a:solidFill>
-                <a:srgbClr val="454545"/>
-              </a:solidFill>
-              <a:latin typeface="Helvetica" panose="020B0604020202020204" pitchFamily="34" charset="0"/>
-            </a:endParaRPr>
           </a:p>
           <a:p>
             <a:pPr algn="ctr"/>
@@ -10972,23 +12229,8 @@
                 </a:solidFill>
                 <a:latin typeface="Helvetica" panose="020B0604020202020204" pitchFamily="34" charset="0"/>
               </a:rPr>
-              <a:t>“</a:t>
-            </a:r>
-            <a:r>
-              <a:rPr lang="en-US" i="1" dirty="0" smtClean="0">
-                <a:solidFill>
-                  <a:srgbClr val="454545"/>
-                </a:solidFill>
-                <a:latin typeface="Helvetica" panose="020B0604020202020204" pitchFamily="34" charset="0"/>
-              </a:rPr>
-              <a:t>having enhanced our understanding of </a:t>
-            </a:r>
-            <a:endParaRPr lang="en-US" i="1" dirty="0" smtClean="0">
-              <a:solidFill>
-                <a:srgbClr val="454545"/>
-              </a:solidFill>
-              <a:latin typeface="Helvetica" panose="020B0604020202020204" pitchFamily="34" charset="0"/>
-            </a:endParaRPr>
+              <a:t>“having enhanced our understanding of </a:t>
+            </a:r>
           </a:p>
           <a:p>
             <a:pPr algn="ctr"/>
@@ -11001,12 +12243,6 @@
               </a:rPr>
               <a:t>conflict and cooperation </a:t>
             </a:r>
-            <a:endParaRPr lang="en-US" i="1" dirty="0" smtClean="0">
-              <a:solidFill>
-                <a:srgbClr val="454545"/>
-              </a:solidFill>
-              <a:latin typeface="Helvetica" panose="020B0604020202020204" pitchFamily="34" charset="0"/>
-            </a:endParaRPr>
           </a:p>
           <a:p>
             <a:pPr algn="ctr"/>
@@ -11017,16 +12253,7 @@
                 </a:solidFill>
                 <a:latin typeface="Helvetica" panose="020B0604020202020204" pitchFamily="34" charset="0"/>
               </a:rPr>
-              <a:t>through game-theory analysis</a:t>
-            </a:r>
-            <a:r>
-              <a:rPr lang="en-US" i="1" dirty="0" smtClean="0">
-                <a:solidFill>
-                  <a:srgbClr val="454545"/>
-                </a:solidFill>
-                <a:latin typeface="Helvetica" panose="020B0604020202020204" pitchFamily="34" charset="0"/>
-              </a:rPr>
-              <a:t>”</a:t>
+              <a:t>through game-theory analysis”</a:t>
             </a:r>
             <a:endParaRPr lang="en-US" i="1" dirty="0">
               <a:solidFill>
@@ -11154,13 +12381,7 @@
               <a:rPr lang="en-US" dirty="0" smtClean="0">
                 <a:hlinkClick r:id="rId2"/>
               </a:rPr>
-              <a:t> </a:t>
-            </a:r>
-            <a:r>
-              <a:rPr lang="en-US" dirty="0" smtClean="0">
-                <a:hlinkClick r:id="rId2"/>
-              </a:rPr>
-              <a:t>		2014</a:t>
+              <a:t> 		2014</a:t>
             </a:r>
             <a:endParaRPr lang="en-US" dirty="0" smtClean="0"/>
           </a:p>
@@ -11199,19 +12420,7 @@
               <a:rPr lang="en-US" dirty="0" smtClean="0">
                 <a:hlinkClick r:id="rId5"/>
               </a:rPr>
-              <a:t>Roger B. </a:t>
-            </a:r>
-            <a:r>
-              <a:rPr lang="en-US" dirty="0" smtClean="0">
-                <a:hlinkClick r:id="rId5"/>
-              </a:rPr>
-              <a:t>Myerson  </a:t>
-            </a:r>
-            <a:r>
-              <a:rPr lang="en-US" dirty="0" smtClean="0">
-                <a:hlinkClick r:id="rId5"/>
-              </a:rPr>
-              <a:t>	2007</a:t>
+              <a:t>Roger B. Myerson  	2007</a:t>
             </a:r>
             <a:endParaRPr lang="en-US" dirty="0" smtClean="0"/>
           </a:p>

</xml_diff>